<commit_message>
Esqueleto da UI , States & Class Context
</commit_message>
<xml_diff>
--- a/DiagramasTP.pptx
+++ b/DiagramasTP.pptx
@@ -255,7 +255,7 @@
           <a:p>
             <a:fld id="{7494F5DC-26D8-4B90-A0B7-D4CE53E143AD}" type="datetimeFigureOut">
               <a:rPr lang="pt-PT" smtClean="0"/>
-              <a:t>25/04/2022</a:t>
+              <a:t>26/04/2022</a:t>
             </a:fld>
             <a:endParaRPr lang="pt-PT" dirty="0"/>
           </a:p>
@@ -425,7 +425,7 @@
           <a:p>
             <a:fld id="{7494F5DC-26D8-4B90-A0B7-D4CE53E143AD}" type="datetimeFigureOut">
               <a:rPr lang="pt-PT" smtClean="0"/>
-              <a:t>25/04/2022</a:t>
+              <a:t>26/04/2022</a:t>
             </a:fld>
             <a:endParaRPr lang="pt-PT" dirty="0"/>
           </a:p>
@@ -605,7 +605,7 @@
           <a:p>
             <a:fld id="{7494F5DC-26D8-4B90-A0B7-D4CE53E143AD}" type="datetimeFigureOut">
               <a:rPr lang="pt-PT" smtClean="0"/>
-              <a:t>25/04/2022</a:t>
+              <a:t>26/04/2022</a:t>
             </a:fld>
             <a:endParaRPr lang="pt-PT" dirty="0"/>
           </a:p>
@@ -775,7 +775,7 @@
           <a:p>
             <a:fld id="{7494F5DC-26D8-4B90-A0B7-D4CE53E143AD}" type="datetimeFigureOut">
               <a:rPr lang="pt-PT" smtClean="0"/>
-              <a:t>25/04/2022</a:t>
+              <a:t>26/04/2022</a:t>
             </a:fld>
             <a:endParaRPr lang="pt-PT" dirty="0"/>
           </a:p>
@@ -1019,7 +1019,7 @@
           <a:p>
             <a:fld id="{7494F5DC-26D8-4B90-A0B7-D4CE53E143AD}" type="datetimeFigureOut">
               <a:rPr lang="pt-PT" smtClean="0"/>
-              <a:t>25/04/2022</a:t>
+              <a:t>26/04/2022</a:t>
             </a:fld>
             <a:endParaRPr lang="pt-PT" dirty="0"/>
           </a:p>
@@ -1251,7 +1251,7 @@
           <a:p>
             <a:fld id="{7494F5DC-26D8-4B90-A0B7-D4CE53E143AD}" type="datetimeFigureOut">
               <a:rPr lang="pt-PT" smtClean="0"/>
-              <a:t>25/04/2022</a:t>
+              <a:t>26/04/2022</a:t>
             </a:fld>
             <a:endParaRPr lang="pt-PT" dirty="0"/>
           </a:p>
@@ -1618,7 +1618,7 @@
           <a:p>
             <a:fld id="{7494F5DC-26D8-4B90-A0B7-D4CE53E143AD}" type="datetimeFigureOut">
               <a:rPr lang="pt-PT" smtClean="0"/>
-              <a:t>25/04/2022</a:t>
+              <a:t>26/04/2022</a:t>
             </a:fld>
             <a:endParaRPr lang="pt-PT" dirty="0"/>
           </a:p>
@@ -1736,7 +1736,7 @@
           <a:p>
             <a:fld id="{7494F5DC-26D8-4B90-A0B7-D4CE53E143AD}" type="datetimeFigureOut">
               <a:rPr lang="pt-PT" smtClean="0"/>
-              <a:t>25/04/2022</a:t>
+              <a:t>26/04/2022</a:t>
             </a:fld>
             <a:endParaRPr lang="pt-PT" dirty="0"/>
           </a:p>
@@ -1831,7 +1831,7 @@
           <a:p>
             <a:fld id="{7494F5DC-26D8-4B90-A0B7-D4CE53E143AD}" type="datetimeFigureOut">
               <a:rPr lang="pt-PT" smtClean="0"/>
-              <a:t>25/04/2022</a:t>
+              <a:t>26/04/2022</a:t>
             </a:fld>
             <a:endParaRPr lang="pt-PT" dirty="0"/>
           </a:p>
@@ -2108,7 +2108,7 @@
           <a:p>
             <a:fld id="{7494F5DC-26D8-4B90-A0B7-D4CE53E143AD}" type="datetimeFigureOut">
               <a:rPr lang="pt-PT" smtClean="0"/>
-              <a:t>25/04/2022</a:t>
+              <a:t>26/04/2022</a:t>
             </a:fld>
             <a:endParaRPr lang="pt-PT" dirty="0"/>
           </a:p>
@@ -2365,7 +2365,7 @@
           <a:p>
             <a:fld id="{7494F5DC-26D8-4B90-A0B7-D4CE53E143AD}" type="datetimeFigureOut">
               <a:rPr lang="pt-PT" smtClean="0"/>
-              <a:t>25/04/2022</a:t>
+              <a:t>26/04/2022</a:t>
             </a:fld>
             <a:endParaRPr lang="pt-PT" dirty="0"/>
           </a:p>
@@ -2578,7 +2578,7 @@
           <a:p>
             <a:fld id="{7494F5DC-26D8-4B90-A0B7-D4CE53E143AD}" type="datetimeFigureOut">
               <a:rPr lang="pt-PT" smtClean="0"/>
-              <a:t>25/04/2022</a:t>
+              <a:t>26/04/2022</a:t>
             </a:fld>
             <a:endParaRPr lang="pt-PT" dirty="0"/>
           </a:p>
@@ -2983,6 +2983,176 @@
           <a:chExt cx="0" cy="0"/>
         </a:xfrm>
       </p:grpSpPr>
+      <p:cxnSp>
+        <p:nvCxnSpPr>
+          <p:cNvPr id="111" name="Conexão: Ângulo Reto 110">
+            <a:extLst>
+              <a:ext uri="{FF2B5EF4-FFF2-40B4-BE49-F238E27FC236}">
+                <a16:creationId xmlns:a16="http://schemas.microsoft.com/office/drawing/2014/main" id="{8435C52E-CE25-48A0-A9B0-47FB5A2E6CBE}"/>
+              </a:ext>
+            </a:extLst>
+          </p:cNvPr>
+          <p:cNvCxnSpPr>
+            <a:cxnSpLocks/>
+            <a:endCxn id="80" idx="1"/>
+          </p:cNvCxnSpPr>
+          <p:nvPr/>
+        </p:nvCxnSpPr>
+        <p:spPr>
+          <a:xfrm rot="5400000" flipH="1" flipV="1">
+            <a:off x="-545952" y="2862410"/>
+            <a:ext cx="3277892" cy="306388"/>
+          </a:xfrm>
+          <a:prstGeom prst="bentConnector2">
+            <a:avLst/>
+          </a:prstGeom>
+          <a:ln>
+            <a:tailEnd type="triangle"/>
+          </a:ln>
+        </p:spPr>
+        <p:style>
+          <a:lnRef idx="1">
+            <a:schemeClr val="accent3"/>
+          </a:lnRef>
+          <a:fillRef idx="0">
+            <a:schemeClr val="accent3"/>
+          </a:fillRef>
+          <a:effectRef idx="0">
+            <a:schemeClr val="accent3"/>
+          </a:effectRef>
+          <a:fontRef idx="minor">
+            <a:schemeClr val="tx1"/>
+          </a:fontRef>
+        </p:style>
+      </p:cxnSp>
+      <p:cxnSp>
+        <p:nvCxnSpPr>
+          <p:cNvPr id="114" name="Conexão: Ângulo Reto 113">
+            <a:extLst>
+              <a:ext uri="{FF2B5EF4-FFF2-40B4-BE49-F238E27FC236}">
+                <a16:creationId xmlns:a16="http://schemas.microsoft.com/office/drawing/2014/main" id="{BF7F98CA-FA8C-45B6-95A9-A6106FCCAFB8}"/>
+              </a:ext>
+            </a:extLst>
+          </p:cNvPr>
+          <p:cNvCxnSpPr>
+            <a:cxnSpLocks/>
+          </p:cNvCxnSpPr>
+          <p:nvPr/>
+        </p:nvCxnSpPr>
+        <p:spPr>
+          <a:xfrm rot="16200000" flipV="1">
+            <a:off x="2814454" y="2960502"/>
+            <a:ext cx="1512592" cy="313404"/>
+          </a:xfrm>
+          <a:prstGeom prst="bentConnector2">
+            <a:avLst/>
+          </a:prstGeom>
+          <a:ln>
+            <a:tailEnd type="triangle"/>
+          </a:ln>
+        </p:spPr>
+        <p:style>
+          <a:lnRef idx="1">
+            <a:schemeClr val="accent3"/>
+          </a:lnRef>
+          <a:fillRef idx="2">
+            <a:schemeClr val="accent3"/>
+          </a:fillRef>
+          <a:effectRef idx="1">
+            <a:schemeClr val="accent3"/>
+          </a:effectRef>
+          <a:fontRef idx="minor">
+            <a:schemeClr val="dk1"/>
+          </a:fontRef>
+        </p:style>
+      </p:cxnSp>
+      <p:cxnSp>
+        <p:nvCxnSpPr>
+          <p:cNvPr id="217" name="Conexão: Ângulo Reto 216">
+            <a:extLst>
+              <a:ext uri="{FF2B5EF4-FFF2-40B4-BE49-F238E27FC236}">
+                <a16:creationId xmlns:a16="http://schemas.microsoft.com/office/drawing/2014/main" id="{BD00CB62-97C6-4B58-884B-AC9860509D16}"/>
+              </a:ext>
+            </a:extLst>
+          </p:cNvPr>
+          <p:cNvCxnSpPr>
+            <a:cxnSpLocks/>
+          </p:cNvCxnSpPr>
+          <p:nvPr/>
+        </p:nvCxnSpPr>
+        <p:spPr>
+          <a:xfrm flipV="1">
+            <a:off x="234950" y="1584403"/>
+            <a:ext cx="5821362" cy="3095547"/>
+          </a:xfrm>
+          <a:prstGeom prst="bentConnector4">
+            <a:avLst>
+              <a:gd name="adj1" fmla="val 178"/>
+              <a:gd name="adj2" fmla="val 142874"/>
+            </a:avLst>
+          </a:prstGeom>
+          <a:ln>
+            <a:tailEnd type="triangle"/>
+          </a:ln>
+        </p:spPr>
+        <p:style>
+          <a:lnRef idx="1">
+            <a:schemeClr val="accent3"/>
+          </a:lnRef>
+          <a:fillRef idx="0">
+            <a:schemeClr val="accent3"/>
+          </a:fillRef>
+          <a:effectRef idx="0">
+            <a:schemeClr val="accent3"/>
+          </a:effectRef>
+          <a:fontRef idx="minor">
+            <a:schemeClr val="tx1"/>
+          </a:fontRef>
+        </p:style>
+      </p:cxnSp>
+      <p:cxnSp>
+        <p:nvCxnSpPr>
+          <p:cNvPr id="56" name="Conexão: Ângulo Reto 55">
+            <a:extLst>
+              <a:ext uri="{FF2B5EF4-FFF2-40B4-BE49-F238E27FC236}">
+                <a16:creationId xmlns:a16="http://schemas.microsoft.com/office/drawing/2014/main" id="{DD0F47EC-CD24-440F-9BAE-0C648CA2E8DF}"/>
+              </a:ext>
+            </a:extLst>
+          </p:cNvPr>
+          <p:cNvCxnSpPr>
+            <a:cxnSpLocks/>
+          </p:cNvCxnSpPr>
+          <p:nvPr/>
+        </p:nvCxnSpPr>
+        <p:spPr>
+          <a:xfrm rot="10800000" flipV="1">
+            <a:off x="1257300" y="4114798"/>
+            <a:ext cx="1746252" cy="381002"/>
+          </a:xfrm>
+          <a:prstGeom prst="bentConnector3">
+            <a:avLst>
+              <a:gd name="adj1" fmla="val 99818"/>
+            </a:avLst>
+          </a:prstGeom>
+          <a:ln>
+            <a:tailEnd type="triangle"/>
+          </a:ln>
+        </p:spPr>
+        <p:style>
+          <a:lnRef idx="1">
+            <a:schemeClr val="accent3"/>
+          </a:lnRef>
+          <a:fillRef idx="2">
+            <a:schemeClr val="accent3"/>
+          </a:fillRef>
+          <a:effectRef idx="1">
+            <a:schemeClr val="accent3"/>
+          </a:effectRef>
+          <a:fontRef idx="minor">
+            <a:schemeClr val="dk1"/>
+          </a:fontRef>
+        </p:style>
+      </p:cxnSp>
       <p:sp>
         <p:nvSpPr>
           <p:cNvPr id="4" name="Retângulo: Cantos Arredondados 3">
@@ -2997,7 +3167,7 @@
         </p:nvSpPr>
         <p:spPr>
           <a:xfrm>
-            <a:off x="1552969" y="909868"/>
+            <a:off x="1995606" y="2005090"/>
             <a:ext cx="1456542" cy="406835"/>
           </a:xfrm>
           <a:prstGeom prst="roundRect">
@@ -3055,7 +3225,7 @@
         </p:nvSpPr>
         <p:spPr>
           <a:xfrm>
-            <a:off x="2700729" y="2476500"/>
+            <a:off x="2723877" y="3755871"/>
             <a:ext cx="1456542" cy="406835"/>
           </a:xfrm>
           <a:prstGeom prst="roundRect">
@@ -3113,7 +3283,7 @@
         </p:nvSpPr>
         <p:spPr>
           <a:xfrm>
-            <a:off x="2700729" y="8823043"/>
+            <a:off x="2723876" y="9499165"/>
             <a:ext cx="1456542" cy="406835"/>
           </a:xfrm>
           <a:prstGeom prst="roundRect">
@@ -3140,10 +3310,9 @@
           <a:p>
             <a:pPr algn="ctr"/>
             <a:r>
-              <a:rPr lang="pt-PT" sz="1000"/>
+              <a:rPr lang="pt-PT" sz="1000" dirty="0"/>
               <a:t>Consulta</a:t>
             </a:r>
-            <a:endParaRPr lang="pt-PT" sz="1000" dirty="0"/>
           </a:p>
           <a:p>
             <a:pPr algn="ctr"/>
@@ -3172,7 +3341,7 @@
         </p:nvSpPr>
         <p:spPr>
           <a:xfrm>
-            <a:off x="96427" y="3825658"/>
+            <a:off x="119574" y="4501780"/>
             <a:ext cx="1456542" cy="406835"/>
           </a:xfrm>
           <a:prstGeom prst="roundRect">
@@ -3219,7 +3388,7 @@
         </p:nvSpPr>
         <p:spPr>
           <a:xfrm>
-            <a:off x="2700729" y="5255777"/>
+            <a:off x="2723876" y="5931899"/>
             <a:ext cx="1456542" cy="406835"/>
           </a:xfrm>
           <a:prstGeom prst="roundRect">
@@ -3277,7 +3446,7 @@
         </p:nvSpPr>
         <p:spPr>
           <a:xfrm>
-            <a:off x="5378311" y="3804586"/>
+            <a:off x="5401458" y="4480708"/>
             <a:ext cx="1456542" cy="406835"/>
           </a:xfrm>
           <a:prstGeom prst="roundRect">
@@ -3308,6 +3477,18 @@
               <a:t>ConsultaEmpates</a:t>
             </a:r>
           </a:p>
+          <a:p>
+            <a:pPr algn="ctr"/>
+            <a:r>
+              <a:rPr lang="pt-PT" sz="1000" dirty="0">
+                <a:solidFill>
+                  <a:srgbClr val="C00000"/>
+                </a:solidFill>
+              </a:rPr>
+              <a:t>Fase3</a:t>
+            </a:r>
+            <a:endParaRPr lang="pt-PT" sz="1000" dirty="0"/>
+          </a:p>
         </p:txBody>
       </p:sp>
       <p:sp>
@@ -3324,7 +3505,7 @@
         </p:nvSpPr>
         <p:spPr>
           <a:xfrm>
-            <a:off x="2711184" y="7562675"/>
+            <a:off x="2734331" y="8238797"/>
             <a:ext cx="1456542" cy="406835"/>
           </a:xfrm>
           <a:prstGeom prst="roundRect">
@@ -3381,17 +3562,19 @@
               </a:ext>
             </a:extLst>
           </p:cNvPr>
-          <p:cNvCxnSpPr/>
+          <p:cNvCxnSpPr>
+            <a:cxnSpLocks/>
+          </p:cNvCxnSpPr>
           <p:nvPr/>
         </p:nvCxnSpPr>
         <p:spPr>
           <a:xfrm rot="16200000" flipH="1">
-            <a:off x="1679465" y="1408151"/>
-            <a:ext cx="1159797" cy="990011"/>
+            <a:off x="2108198" y="2965448"/>
+            <a:ext cx="1308102" cy="266702"/>
           </a:xfrm>
           <a:prstGeom prst="bentConnector3">
             <a:avLst>
-              <a:gd name="adj1" fmla="val 65878"/>
+              <a:gd name="adj1" fmla="val 17961"/>
             </a:avLst>
           </a:prstGeom>
           <a:ln>
@@ -3423,19 +3606,18 @@
             </a:extLst>
           </p:cNvPr>
           <p:cNvCxnSpPr>
-            <a:stCxn id="4" idx="2"/>
-            <a:endCxn id="5" idx="0"/>
+            <a:cxnSpLocks/>
           </p:cNvCxnSpPr>
           <p:nvPr/>
         </p:nvCxnSpPr>
         <p:spPr>
           <a:xfrm rot="16200000" flipH="1">
-            <a:off x="2275222" y="1322721"/>
-            <a:ext cx="1159797" cy="1147760"/>
+            <a:off x="2550067" y="3006190"/>
+            <a:ext cx="1311118" cy="226345"/>
           </a:xfrm>
           <a:prstGeom prst="bentConnector3">
             <a:avLst>
-              <a:gd name="adj1" fmla="val 50000"/>
+              <a:gd name="adj1" fmla="val 50484"/>
             </a:avLst>
           </a:prstGeom>
           <a:ln>
@@ -3466,17 +3648,19 @@
               </a:ext>
             </a:extLst>
           </p:cNvPr>
-          <p:cNvCxnSpPr/>
+          <p:cNvCxnSpPr>
+            <a:cxnSpLocks/>
+          </p:cNvCxnSpPr>
           <p:nvPr/>
         </p:nvCxnSpPr>
         <p:spPr>
           <a:xfrm rot="16200000" flipH="1">
-            <a:off x="2088607" y="3952072"/>
-            <a:ext cx="2398661" cy="190355"/>
+            <a:off x="2412079" y="4928520"/>
+            <a:ext cx="1738052" cy="250311"/>
           </a:xfrm>
           <a:prstGeom prst="bentConnector3">
             <a:avLst>
-              <a:gd name="adj1" fmla="val 64745"/>
+              <a:gd name="adj1" fmla="val 50000"/>
             </a:avLst>
           </a:prstGeom>
           <a:ln>
@@ -3514,139 +3698,12 @@
         </p:nvCxnSpPr>
         <p:spPr>
           <a:xfrm rot="16200000" flipH="1">
-            <a:off x="2690369" y="3982466"/>
-            <a:ext cx="2350153" cy="180002"/>
+            <a:off x="2923192" y="4919064"/>
+            <a:ext cx="1751712" cy="244790"/>
           </a:xfrm>
           <a:prstGeom prst="bentConnector3">
             <a:avLst>
-              <a:gd name="adj1" fmla="val 46001"/>
-            </a:avLst>
-          </a:prstGeom>
-          <a:ln>
-            <a:tailEnd type="triangle"/>
-          </a:ln>
-        </p:spPr>
-        <p:style>
-          <a:lnRef idx="1">
-            <a:schemeClr val="accent3"/>
-          </a:lnRef>
-          <a:fillRef idx="2">
-            <a:schemeClr val="accent3"/>
-          </a:fillRef>
-          <a:effectRef idx="1">
-            <a:schemeClr val="accent3"/>
-          </a:effectRef>
-          <a:fontRef idx="minor">
-            <a:schemeClr val="dk1"/>
-          </a:fontRef>
-        </p:style>
-      </p:cxnSp>
-      <p:cxnSp>
-        <p:nvCxnSpPr>
-          <p:cNvPr id="49" name="Conexão: Ângulo Reto 48">
-            <a:extLst>
-              <a:ext uri="{FF2B5EF4-FFF2-40B4-BE49-F238E27FC236}">
-                <a16:creationId xmlns:a16="http://schemas.microsoft.com/office/drawing/2014/main" id="{F48E6BB1-C01D-45AC-9BA1-7D8945EDB48F}"/>
-              </a:ext>
-            </a:extLst>
-          </p:cNvPr>
-          <p:cNvCxnSpPr>
-            <a:stCxn id="4" idx="1"/>
-          </p:cNvCxnSpPr>
-          <p:nvPr/>
-        </p:nvCxnSpPr>
-        <p:spPr>
-          <a:xfrm rot="10800000" flipV="1">
-            <a:off x="188965" y="1113286"/>
-            <a:ext cx="1364005" cy="2712372"/>
-          </a:xfrm>
-          <a:prstGeom prst="bentConnector2">
-            <a:avLst/>
-          </a:prstGeom>
-          <a:ln>
-            <a:tailEnd type="triangle"/>
-          </a:ln>
-        </p:spPr>
-        <p:style>
-          <a:lnRef idx="1">
-            <a:schemeClr val="accent3"/>
-          </a:lnRef>
-          <a:fillRef idx="2">
-            <a:schemeClr val="accent3"/>
-          </a:fillRef>
-          <a:effectRef idx="1">
-            <a:schemeClr val="accent3"/>
-          </a:effectRef>
-          <a:fontRef idx="minor">
-            <a:schemeClr val="dk1"/>
-          </a:fontRef>
-        </p:style>
-      </p:cxnSp>
-      <p:cxnSp>
-        <p:nvCxnSpPr>
-          <p:cNvPr id="51" name="Conexão: Ângulo Reto 50">
-            <a:extLst>
-              <a:ext uri="{FF2B5EF4-FFF2-40B4-BE49-F238E27FC236}">
-                <a16:creationId xmlns:a16="http://schemas.microsoft.com/office/drawing/2014/main" id="{59A0EE11-CA9D-42BB-BAA1-7F184AA71295}"/>
-              </a:ext>
-            </a:extLst>
-          </p:cNvPr>
-          <p:cNvCxnSpPr>
-            <a:cxnSpLocks/>
-          </p:cNvCxnSpPr>
-          <p:nvPr/>
-        </p:nvCxnSpPr>
-        <p:spPr>
-          <a:xfrm rot="5400000" flipH="1" flipV="1">
-            <a:off x="-346844" y="1921753"/>
-            <a:ext cx="2605661" cy="1174039"/>
-          </a:xfrm>
-          <a:prstGeom prst="bentConnector3">
-            <a:avLst>
-              <a:gd name="adj1" fmla="val 99959"/>
-            </a:avLst>
-          </a:prstGeom>
-          <a:ln>
-            <a:tailEnd type="triangle"/>
-          </a:ln>
-        </p:spPr>
-        <p:style>
-          <a:lnRef idx="1">
-            <a:schemeClr val="accent3"/>
-          </a:lnRef>
-          <a:fillRef idx="2">
-            <a:schemeClr val="accent3"/>
-          </a:fillRef>
-          <a:effectRef idx="1">
-            <a:schemeClr val="accent3"/>
-          </a:effectRef>
-          <a:fontRef idx="minor">
-            <a:schemeClr val="dk1"/>
-          </a:fontRef>
-        </p:style>
-      </p:cxnSp>
-      <p:cxnSp>
-        <p:nvCxnSpPr>
-          <p:cNvPr id="56" name="Conexão: Ângulo Reto 55">
-            <a:extLst>
-              <a:ext uri="{FF2B5EF4-FFF2-40B4-BE49-F238E27FC236}">
-                <a16:creationId xmlns:a16="http://schemas.microsoft.com/office/drawing/2014/main" id="{DD0F47EC-CD24-440F-9BAE-0C648CA2E8DF}"/>
-              </a:ext>
-            </a:extLst>
-          </p:cNvPr>
-          <p:cNvCxnSpPr>
-            <a:stCxn id="5" idx="1"/>
-          </p:cNvCxnSpPr>
-          <p:nvPr/>
-        </p:nvCxnSpPr>
-        <p:spPr>
-          <a:xfrm rot="10800000" flipV="1">
-            <a:off x="603827" y="2679918"/>
-            <a:ext cx="2096902" cy="1124668"/>
-          </a:xfrm>
-          <a:prstGeom prst="bentConnector3">
-            <a:avLst>
-              <a:gd name="adj1" fmla="val 99360"/>
+              <a:gd name="adj1" fmla="val 31512"/>
             </a:avLst>
           </a:prstGeom>
           <a:ln>
@@ -3678,17 +3735,20 @@
             </a:extLst>
           </p:cNvPr>
           <p:cNvCxnSpPr>
-            <a:stCxn id="8" idx="0"/>
+            <a:cxnSpLocks/>
+            <a:endCxn id="5" idx="1"/>
           </p:cNvCxnSpPr>
           <p:nvPr/>
         </p:nvCxnSpPr>
         <p:spPr>
-          <a:xfrm rot="5400000" flipH="1" flipV="1">
-            <a:off x="1278442" y="2403372"/>
-            <a:ext cx="968543" cy="1876031"/>
-          </a:xfrm>
-          <a:prstGeom prst="bentConnector2">
-            <a:avLst/>
+          <a:xfrm flipV="1">
+            <a:off x="1095495" y="3959289"/>
+            <a:ext cx="1628382" cy="536141"/>
+          </a:xfrm>
+          <a:prstGeom prst="bentConnector3">
+            <a:avLst>
+              <a:gd name="adj1" fmla="val 4765"/>
+            </a:avLst>
           </a:prstGeom>
           <a:ln>
             <a:tailEnd type="triangle"/>
@@ -3723,7 +3783,7 @@
         </p:nvCxnSpPr>
         <p:spPr>
           <a:xfrm>
-            <a:off x="1277788" y="4253564"/>
+            <a:off x="1300935" y="4929686"/>
             <a:ext cx="1422941" cy="1091436"/>
           </a:xfrm>
           <a:prstGeom prst="bentConnector3">
@@ -3766,7 +3826,7 @@
         </p:nvCxnSpPr>
         <p:spPr>
           <a:xfrm rot="10800000">
-            <a:off x="1088975" y="4232493"/>
+            <a:off x="1112122" y="4908615"/>
             <a:ext cx="1611755" cy="1226702"/>
           </a:xfrm>
           <a:prstGeom prst="bentConnector3">
@@ -3809,7 +3869,7 @@
         </p:nvCxnSpPr>
         <p:spPr>
           <a:xfrm rot="16200000" flipV="1">
-            <a:off x="12299" y="5017488"/>
+            <a:off x="35446" y="5693610"/>
             <a:ext cx="3433327" cy="1905476"/>
           </a:xfrm>
           <a:prstGeom prst="bentConnector3">
@@ -3852,7 +3912,7 @@
         </p:nvCxnSpPr>
         <p:spPr>
           <a:xfrm rot="16200000" flipH="1">
-            <a:off x="-170268" y="4973815"/>
+            <a:off x="-147121" y="5649937"/>
             <a:ext cx="3657819" cy="2109629"/>
           </a:xfrm>
           <a:prstGeom prst="bentConnector3">
@@ -3895,7 +3955,7 @@
         </p:nvCxnSpPr>
         <p:spPr>
           <a:xfrm rot="16200000" flipH="1">
-            <a:off x="-806600" y="5519131"/>
+            <a:off x="-783453" y="6195253"/>
             <a:ext cx="4772897" cy="2241762"/>
           </a:xfrm>
           <a:prstGeom prst="bentConnector2">
@@ -3934,7 +3994,7 @@
         </p:nvCxnSpPr>
         <p:spPr>
           <a:xfrm rot="16200000" flipV="1">
-            <a:off x="-933401" y="5548917"/>
+            <a:off x="-910254" y="6225039"/>
             <a:ext cx="4936497" cy="2331764"/>
           </a:xfrm>
           <a:prstGeom prst="bentConnector3">
@@ -3961,48 +4021,6 @@
           </a:fontRef>
         </p:style>
       </p:cxnSp>
-      <p:cxnSp>
-        <p:nvCxnSpPr>
-          <p:cNvPr id="114" name="Conexão: Ângulo Reto 113">
-            <a:extLst>
-              <a:ext uri="{FF2B5EF4-FFF2-40B4-BE49-F238E27FC236}">
-                <a16:creationId xmlns:a16="http://schemas.microsoft.com/office/drawing/2014/main" id="{BF7F98CA-FA8C-45B6-95A9-A6106FCCAFB8}"/>
-              </a:ext>
-            </a:extLst>
-          </p:cNvPr>
-          <p:cNvCxnSpPr>
-            <a:cxnSpLocks/>
-            <a:endCxn id="4" idx="3"/>
-          </p:cNvCxnSpPr>
-          <p:nvPr/>
-        </p:nvCxnSpPr>
-        <p:spPr>
-          <a:xfrm rot="16200000" flipV="1">
-            <a:off x="2705149" y="1417649"/>
-            <a:ext cx="1336995" cy="728269"/>
-          </a:xfrm>
-          <a:prstGeom prst="bentConnector2">
-            <a:avLst/>
-          </a:prstGeom>
-          <a:ln>
-            <a:tailEnd type="triangle"/>
-          </a:ln>
-        </p:spPr>
-        <p:style>
-          <a:lnRef idx="1">
-            <a:schemeClr val="accent3"/>
-          </a:lnRef>
-          <a:fillRef idx="2">
-            <a:schemeClr val="accent3"/>
-          </a:fillRef>
-          <a:effectRef idx="1">
-            <a:schemeClr val="accent3"/>
-          </a:effectRef>
-          <a:fontRef idx="minor">
-            <a:schemeClr val="dk1"/>
-          </a:fontRef>
-        </p:style>
-      </p:cxnSp>
       <p:sp>
         <p:nvSpPr>
           <p:cNvPr id="119" name="Seta: Curvada Para Cima 118">
@@ -4016,9 +4034,9 @@
           <p:nvPr/>
         </p:nvSpPr>
         <p:spPr>
-          <a:xfrm rot="10800000">
-            <a:off x="1591895" y="606679"/>
-            <a:ext cx="333471" cy="293463"/>
+          <a:xfrm rot="10616640">
+            <a:off x="1518073" y="988585"/>
+            <a:ext cx="333471" cy="182177"/>
           </a:xfrm>
           <a:prstGeom prst="curvedUpArrow">
             <a:avLst>
@@ -4058,10 +4076,10 @@
       </p:sp>
       <p:sp>
         <p:nvSpPr>
-          <p:cNvPr id="120" name="Seta: Curvada Para Cima 119">
-            <a:extLst>
-              <a:ext uri="{FF2B5EF4-FFF2-40B4-BE49-F238E27FC236}">
-                <a16:creationId xmlns:a16="http://schemas.microsoft.com/office/drawing/2014/main" id="{6303D58D-731F-4321-A2B1-34765F2295FF}"/>
+          <p:cNvPr id="121" name="Seta: Curvada Para Cima 120">
+            <a:extLst>
+              <a:ext uri="{FF2B5EF4-FFF2-40B4-BE49-F238E27FC236}">
+                <a16:creationId xmlns:a16="http://schemas.microsoft.com/office/drawing/2014/main" id="{1A7452DD-6301-4F23-878B-1CE82C45CF46}"/>
               </a:ext>
             </a:extLst>
           </p:cNvPr>
@@ -4069,9 +4087,9 @@
           <p:nvPr/>
         </p:nvSpPr>
         <p:spPr>
-          <a:xfrm rot="10800000">
-            <a:off x="2388168" y="616403"/>
-            <a:ext cx="333471" cy="293463"/>
+          <a:xfrm rot="12230517">
+            <a:off x="3988596" y="3560810"/>
+            <a:ext cx="333471" cy="288058"/>
           </a:xfrm>
           <a:prstGeom prst="curvedUpArrow">
             <a:avLst>
@@ -4111,10 +4129,10 @@
       </p:sp>
       <p:sp>
         <p:nvSpPr>
-          <p:cNvPr id="121" name="Seta: Curvada Para Cima 120">
-            <a:extLst>
-              <a:ext uri="{FF2B5EF4-FFF2-40B4-BE49-F238E27FC236}">
-                <a16:creationId xmlns:a16="http://schemas.microsoft.com/office/drawing/2014/main" id="{1A7452DD-6301-4F23-878B-1CE82C45CF46}"/>
+          <p:cNvPr id="124" name="Seta: Curvada Para Cima 123">
+            <a:extLst>
+              <a:ext uri="{FF2B5EF4-FFF2-40B4-BE49-F238E27FC236}">
+                <a16:creationId xmlns:a16="http://schemas.microsoft.com/office/drawing/2014/main" id="{70F85A61-21DC-4F6F-B790-9A5143C925B0}"/>
               </a:ext>
             </a:extLst>
           </p:cNvPr>
@@ -4122,9 +4140,9 @@
           <p:nvPr/>
         </p:nvSpPr>
         <p:spPr>
-          <a:xfrm rot="11313774">
-            <a:off x="3863849" y="2186188"/>
-            <a:ext cx="333471" cy="288058"/>
+          <a:xfrm rot="538622">
+            <a:off x="2670061" y="4187530"/>
+            <a:ext cx="333471" cy="291939"/>
           </a:xfrm>
           <a:prstGeom prst="curvedUpArrow">
             <a:avLst>
@@ -4162,59 +4180,6 @@
           </a:p>
         </p:txBody>
       </p:sp>
-      <p:sp>
-        <p:nvSpPr>
-          <p:cNvPr id="124" name="Seta: Curvada Para Cima 123">
-            <a:extLst>
-              <a:ext uri="{FF2B5EF4-FFF2-40B4-BE49-F238E27FC236}">
-                <a16:creationId xmlns:a16="http://schemas.microsoft.com/office/drawing/2014/main" id="{70F85A61-21DC-4F6F-B790-9A5143C925B0}"/>
-              </a:ext>
-            </a:extLst>
-          </p:cNvPr>
-          <p:cNvSpPr/>
-          <p:nvPr/>
-        </p:nvSpPr>
-        <p:spPr>
-          <a:xfrm>
-            <a:off x="2754864" y="2882758"/>
-            <a:ext cx="333471" cy="291939"/>
-          </a:xfrm>
-          <a:prstGeom prst="curvedUpArrow">
-            <a:avLst>
-              <a:gd name="adj1" fmla="val 5816"/>
-              <a:gd name="adj2" fmla="val 27233"/>
-              <a:gd name="adj3" fmla="val 17697"/>
-            </a:avLst>
-          </a:prstGeom>
-          <a:ln/>
-        </p:spPr>
-        <p:style>
-          <a:lnRef idx="1">
-            <a:schemeClr val="accent3"/>
-          </a:lnRef>
-          <a:fillRef idx="2">
-            <a:schemeClr val="accent3"/>
-          </a:fillRef>
-          <a:effectRef idx="1">
-            <a:schemeClr val="accent3"/>
-          </a:effectRef>
-          <a:fontRef idx="minor">
-            <a:schemeClr val="dk1"/>
-          </a:fontRef>
-        </p:style>
-        <p:txBody>
-          <a:bodyPr rtlCol="0" anchor="ctr"/>
-          <a:lstStyle/>
-          <a:p>
-            <a:pPr algn="ctr"/>
-            <a:endParaRPr lang="pt-PT" dirty="0">
-              <a:solidFill>
-                <a:schemeClr val="tx1"/>
-              </a:solidFill>
-            </a:endParaRPr>
-          </a:p>
-        </p:txBody>
-      </p:sp>
       <p:cxnSp>
         <p:nvCxnSpPr>
           <p:cNvPr id="129" name="Conexão: Ângulo Reto 128">
@@ -4226,18 +4191,19 @@
           </p:cNvPr>
           <p:cNvCxnSpPr>
             <a:cxnSpLocks/>
+            <a:endCxn id="5" idx="3"/>
           </p:cNvCxnSpPr>
           <p:nvPr/>
         </p:nvCxnSpPr>
         <p:spPr>
           <a:xfrm rot="5400000" flipH="1" flipV="1">
-            <a:off x="2857090" y="3963762"/>
-            <a:ext cx="2575859" cy="8168"/>
+            <a:off x="3133229" y="4959910"/>
+            <a:ext cx="2047810" cy="46569"/>
           </a:xfrm>
           <a:prstGeom prst="bentConnector4">
             <a:avLst>
-              <a:gd name="adj1" fmla="val -1281"/>
-              <a:gd name="adj2" fmla="val 2898727"/>
+              <a:gd name="adj1" fmla="val 690"/>
+              <a:gd name="adj2" fmla="val 590884"/>
             </a:avLst>
           </a:prstGeom>
           <a:ln>
@@ -4275,7 +4241,7 @@
         </p:nvCxnSpPr>
         <p:spPr>
           <a:xfrm flipV="1">
-            <a:off x="4161831" y="4232493"/>
+            <a:off x="4184978" y="4908615"/>
             <a:ext cx="1611755" cy="1226702"/>
           </a:xfrm>
           <a:prstGeom prst="bentConnector3">
@@ -4319,7 +4285,7 @@
         </p:nvCxnSpPr>
         <p:spPr>
           <a:xfrm rot="5400000">
-            <a:off x="4433882" y="3910307"/>
+            <a:off x="4457029" y="4586429"/>
             <a:ext cx="1371586" cy="1973814"/>
           </a:xfrm>
           <a:prstGeom prst="bentConnector2">
@@ -4358,7 +4324,7 @@
         </p:nvSpPr>
         <p:spPr>
           <a:xfrm rot="10800000">
-            <a:off x="2755781" y="4954081"/>
+            <a:off x="2778928" y="5630203"/>
             <a:ext cx="333471" cy="293463"/>
           </a:xfrm>
           <a:prstGeom prst="curvedUpArrow">
@@ -4411,7 +4377,7 @@
         </p:nvSpPr>
         <p:spPr>
           <a:xfrm rot="15858142">
-            <a:off x="4144889" y="8863681"/>
+            <a:off x="4168036" y="9539803"/>
             <a:ext cx="333471" cy="293463"/>
           </a:xfrm>
           <a:prstGeom prst="curvedUpArrow">
@@ -4467,7 +4433,7 @@
         </p:nvCxnSpPr>
         <p:spPr>
           <a:xfrm flipH="1">
-            <a:off x="3429000" y="7969510"/>
+            <a:off x="3452147" y="8645632"/>
             <a:ext cx="10455" cy="853533"/>
           </a:xfrm>
           <a:prstGeom prst="straightConnector1">
@@ -4506,7 +4472,7 @@
         </p:nvCxnSpPr>
         <p:spPr>
           <a:xfrm rot="16200000" flipH="1">
-            <a:off x="2284322" y="6537970"/>
+            <a:off x="2307469" y="7214092"/>
             <a:ext cx="1900063" cy="180295"/>
           </a:xfrm>
           <a:prstGeom prst="bentConnector3">
@@ -4545,7 +4511,7 @@
         </p:nvCxnSpPr>
         <p:spPr>
           <a:xfrm rot="16200000" flipH="1">
-            <a:off x="2947814" y="6536054"/>
+            <a:off x="2970961" y="7212176"/>
             <a:ext cx="1900064" cy="184125"/>
           </a:xfrm>
           <a:prstGeom prst="bentConnector3">
@@ -4588,7 +4554,7 @@
         </p:nvCxnSpPr>
         <p:spPr>
           <a:xfrm flipH="1" flipV="1">
-            <a:off x="4149064" y="5670348"/>
+            <a:off x="4172211" y="6346470"/>
             <a:ext cx="18662" cy="2095745"/>
           </a:xfrm>
           <a:prstGeom prst="bentConnector4">
@@ -4630,7 +4596,7 @@
         </p:nvSpPr>
         <p:spPr>
           <a:xfrm rot="1610435">
-            <a:off x="2585649" y="5628480"/>
+            <a:off x="2608796" y="6304602"/>
             <a:ext cx="333471" cy="293463"/>
           </a:xfrm>
           <a:prstGeom prst="curvedUpArrow">
@@ -4683,7 +4649,7 @@
         </p:nvSpPr>
         <p:spPr>
           <a:xfrm rot="10800000">
-            <a:off x="5458056" y="3506731"/>
+            <a:off x="5481203" y="4182853"/>
             <a:ext cx="333471" cy="293463"/>
           </a:xfrm>
           <a:prstGeom prst="curvedUpArrow">
@@ -4736,7 +4702,7 @@
         </p:nvSpPr>
         <p:spPr>
           <a:xfrm rot="10800000">
-            <a:off x="2757547" y="7274392"/>
+            <a:off x="2780694" y="7950514"/>
             <a:ext cx="333471" cy="293463"/>
           </a:xfrm>
           <a:prstGeom prst="curvedUpArrow">
@@ -4789,7 +4755,7 @@
         </p:nvSpPr>
         <p:spPr>
           <a:xfrm rot="19334459">
-            <a:off x="4011444" y="7885433"/>
+            <a:off x="4034591" y="8561555"/>
             <a:ext cx="333471" cy="293463"/>
           </a:xfrm>
           <a:prstGeom prst="curvedUpArrow">
@@ -4842,7 +4808,7 @@
         </p:nvSpPr>
         <p:spPr>
           <a:xfrm rot="21374889">
-            <a:off x="2799976" y="7980106"/>
+            <a:off x="2823123" y="8656228"/>
             <a:ext cx="333471" cy="293463"/>
           </a:xfrm>
           <a:prstGeom prst="curvedUpArrow">
@@ -4895,8 +4861,1230 @@
         </p:nvSpPr>
         <p:spPr>
           <a:xfrm>
-            <a:off x="4167726" y="109217"/>
-            <a:ext cx="2617946" cy="293464"/>
+            <a:off x="5334000" y="2774476"/>
+            <a:ext cx="1409700" cy="718024"/>
+          </a:xfrm>
+          <a:prstGeom prst="roundRect">
+            <a:avLst/>
+          </a:prstGeom>
+          <a:solidFill>
+            <a:schemeClr val="accent3"/>
+          </a:solidFill>
+          <a:ln w="38100">
+            <a:solidFill>
+              <a:srgbClr val="C00000"/>
+            </a:solidFill>
+          </a:ln>
+        </p:spPr>
+        <p:style>
+          <a:lnRef idx="0">
+            <a:scrgbClr r="0" g="0" b="0"/>
+          </a:lnRef>
+          <a:fillRef idx="0">
+            <a:scrgbClr r="0" g="0" b="0"/>
+          </a:fillRef>
+          <a:effectRef idx="0">
+            <a:scrgbClr r="0" g="0" b="0"/>
+          </a:effectRef>
+          <a:fontRef idx="minor">
+            <a:schemeClr val="lt1"/>
+          </a:fontRef>
+        </p:style>
+        <p:txBody>
+          <a:bodyPr rtlCol="0" anchor="ctr"/>
+          <a:lstStyle/>
+          <a:p>
+            <a:pPr algn="ctr"/>
+            <a:r>
+              <a:rPr lang="pt-PT" sz="1400" dirty="0"/>
+              <a:t>Diagrama de Estados </a:t>
+            </a:r>
+          </a:p>
+        </p:txBody>
+      </p:sp>
+      <p:sp>
+        <p:nvSpPr>
+          <p:cNvPr id="171" name="CaixaDeTexto 170">
+            <a:extLst>
+              <a:ext uri="{FF2B5EF4-FFF2-40B4-BE49-F238E27FC236}">
+                <a16:creationId xmlns:a16="http://schemas.microsoft.com/office/drawing/2014/main" id="{86725331-0997-40B1-9F3D-7D5C12355338}"/>
+              </a:ext>
+            </a:extLst>
+          </p:cNvPr>
+          <p:cNvSpPr txBox="1"/>
+          <p:nvPr/>
+        </p:nvSpPr>
+        <p:spPr>
+          <a:xfrm>
+            <a:off x="992217" y="854652"/>
+            <a:ext cx="710451" cy="215444"/>
+          </a:xfrm>
+          <a:prstGeom prst="rect">
+            <a:avLst/>
+          </a:prstGeom>
+          <a:noFill/>
+        </p:spPr>
+        <p:txBody>
+          <a:bodyPr wrap="none" rtlCol="0">
+            <a:spAutoFit/>
+          </a:bodyPr>
+          <a:lstStyle/>
+          <a:p>
+            <a:r>
+              <a:rPr lang="pt-PT" sz="800" dirty="0"/>
+              <a:t>mostraListas</a:t>
+            </a:r>
+          </a:p>
+        </p:txBody>
+      </p:sp>
+      <p:sp>
+        <p:nvSpPr>
+          <p:cNvPr id="172" name="CaixaDeTexto 171">
+            <a:extLst>
+              <a:ext uri="{FF2B5EF4-FFF2-40B4-BE49-F238E27FC236}">
+                <a16:creationId xmlns:a16="http://schemas.microsoft.com/office/drawing/2014/main" id="{1D3BB3C2-8DFF-4F68-BC5D-142F97A3E25F}"/>
+              </a:ext>
+            </a:extLst>
+          </p:cNvPr>
+          <p:cNvSpPr txBox="1"/>
+          <p:nvPr/>
+        </p:nvSpPr>
+        <p:spPr>
+          <a:xfrm>
+            <a:off x="1282700" y="2178050"/>
+            <a:ext cx="806631" cy="276999"/>
+          </a:xfrm>
+          <a:prstGeom prst="rect">
+            <a:avLst/>
+          </a:prstGeom>
+          <a:noFill/>
+        </p:spPr>
+        <p:txBody>
+          <a:bodyPr wrap="none" rtlCol="0">
+            <a:spAutoFit/>
+          </a:bodyPr>
+          <a:lstStyle/>
+          <a:p>
+            <a:r>
+              <a:rPr lang="pt-PT" sz="600" dirty="0"/>
+              <a:t>editacaoInfoAlunos </a:t>
+            </a:r>
+          </a:p>
+          <a:p>
+            <a:r>
+              <a:rPr lang="pt-PT" sz="600" dirty="0"/>
+              <a:t> &amp;&amp; Fase1 aberta</a:t>
+            </a:r>
+          </a:p>
+        </p:txBody>
+      </p:sp>
+      <p:sp>
+        <p:nvSpPr>
+          <p:cNvPr id="173" name="CaixaDeTexto 172">
+            <a:extLst>
+              <a:ext uri="{FF2B5EF4-FFF2-40B4-BE49-F238E27FC236}">
+                <a16:creationId xmlns:a16="http://schemas.microsoft.com/office/drawing/2014/main" id="{EB10D471-3C45-4C98-83EE-87ED13EDE7A4}"/>
+              </a:ext>
+            </a:extLst>
+          </p:cNvPr>
+          <p:cNvSpPr txBox="1"/>
+          <p:nvPr/>
+        </p:nvSpPr>
+        <p:spPr>
+          <a:xfrm>
+            <a:off x="1038441" y="3256010"/>
+            <a:ext cx="1029449" cy="276999"/>
+          </a:xfrm>
+          <a:prstGeom prst="rect">
+            <a:avLst/>
+          </a:prstGeom>
+          <a:noFill/>
+        </p:spPr>
+        <p:txBody>
+          <a:bodyPr wrap="none" rtlCol="0">
+            <a:spAutoFit/>
+          </a:bodyPr>
+          <a:lstStyle/>
+          <a:p>
+            <a:r>
+              <a:rPr lang="pt-PT" sz="600" dirty="0"/>
+              <a:t>ImportaExportaInfoAlunos </a:t>
+            </a:r>
+          </a:p>
+          <a:p>
+            <a:r>
+              <a:rPr lang="pt-PT" sz="600" dirty="0"/>
+              <a:t>&amp;&amp; Fase1 aberta</a:t>
+            </a:r>
+          </a:p>
+        </p:txBody>
+      </p:sp>
+      <p:sp>
+        <p:nvSpPr>
+          <p:cNvPr id="177" name="CaixaDeTexto 176">
+            <a:extLst>
+              <a:ext uri="{FF2B5EF4-FFF2-40B4-BE49-F238E27FC236}">
+                <a16:creationId xmlns:a16="http://schemas.microsoft.com/office/drawing/2014/main" id="{4FC9D7F5-65EA-463F-B346-8A3A74C70306}"/>
+              </a:ext>
+            </a:extLst>
+          </p:cNvPr>
+          <p:cNvSpPr txBox="1"/>
+          <p:nvPr/>
+        </p:nvSpPr>
+        <p:spPr>
+          <a:xfrm>
+            <a:off x="1898148" y="2747873"/>
+            <a:ext cx="1023037" cy="415498"/>
+          </a:xfrm>
+          <a:prstGeom prst="rect">
+            <a:avLst/>
+          </a:prstGeom>
+          <a:noFill/>
+        </p:spPr>
+        <p:txBody>
+          <a:bodyPr wrap="none" rtlCol="0">
+            <a:spAutoFit/>
+          </a:bodyPr>
+          <a:lstStyle/>
+          <a:p>
+            <a:pPr algn="r"/>
+            <a:r>
+              <a:rPr lang="pt-PT" sz="700" dirty="0"/>
+              <a:t>classificaAlunos</a:t>
+            </a:r>
+          </a:p>
+          <a:p>
+            <a:pPr algn="r"/>
+            <a:r>
+              <a:rPr lang="pt-PT" sz="700" dirty="0"/>
+              <a:t>Fase1 fechada</a:t>
+            </a:r>
+          </a:p>
+          <a:p>
+            <a:pPr algn="r"/>
+            <a:r>
+              <a:rPr lang="pt-PT" sz="700" dirty="0"/>
+              <a:t>nAlunos &lt;= nPropostas</a:t>
+            </a:r>
+          </a:p>
+        </p:txBody>
+      </p:sp>
+      <p:sp>
+        <p:nvSpPr>
+          <p:cNvPr id="180" name="CaixaDeTexto 179">
+            <a:extLst>
+              <a:ext uri="{FF2B5EF4-FFF2-40B4-BE49-F238E27FC236}">
+                <a16:creationId xmlns:a16="http://schemas.microsoft.com/office/drawing/2014/main" id="{66FA3C52-5F51-42F6-8058-911ED8AD1204}"/>
+              </a:ext>
+            </a:extLst>
+          </p:cNvPr>
+          <p:cNvSpPr txBox="1"/>
+          <p:nvPr/>
+        </p:nvSpPr>
+        <p:spPr>
+          <a:xfrm>
+            <a:off x="3020563" y="2834985"/>
+            <a:ext cx="673582" cy="276999"/>
+          </a:xfrm>
+          <a:prstGeom prst="rect">
+            <a:avLst/>
+          </a:prstGeom>
+          <a:noFill/>
+        </p:spPr>
+        <p:txBody>
+          <a:bodyPr wrap="none" rtlCol="0">
+            <a:spAutoFit/>
+          </a:bodyPr>
+          <a:lstStyle/>
+          <a:p>
+            <a:r>
+              <a:rPr lang="pt-PT" sz="600" dirty="0"/>
+              <a:t>classificaAlunos</a:t>
+            </a:r>
+          </a:p>
+          <a:p>
+            <a:r>
+              <a:rPr lang="pt-PT" sz="600" dirty="0"/>
+              <a:t>Fase1 aberta</a:t>
+            </a:r>
+          </a:p>
+        </p:txBody>
+      </p:sp>
+      <p:sp>
+        <p:nvSpPr>
+          <p:cNvPr id="181" name="CaixaDeTexto 180">
+            <a:extLst>
+              <a:ext uri="{FF2B5EF4-FFF2-40B4-BE49-F238E27FC236}">
+                <a16:creationId xmlns:a16="http://schemas.microsoft.com/office/drawing/2014/main" id="{48B68971-5E7F-4E6F-AECC-9DE754020B0C}"/>
+              </a:ext>
+            </a:extLst>
+          </p:cNvPr>
+          <p:cNvSpPr txBox="1"/>
+          <p:nvPr/>
+        </p:nvSpPr>
+        <p:spPr>
+          <a:xfrm>
+            <a:off x="3683086" y="2478393"/>
+            <a:ext cx="587020" cy="276999"/>
+          </a:xfrm>
+          <a:prstGeom prst="rect">
+            <a:avLst/>
+          </a:prstGeom>
+          <a:noFill/>
+        </p:spPr>
+        <p:txBody>
+          <a:bodyPr wrap="none" rtlCol="0">
+            <a:spAutoFit/>
+          </a:bodyPr>
+          <a:lstStyle/>
+          <a:p>
+            <a:r>
+              <a:rPr lang="pt-PT" sz="600" dirty="0"/>
+              <a:t>return</a:t>
+            </a:r>
+          </a:p>
+          <a:p>
+            <a:r>
+              <a:rPr lang="pt-PT" sz="600" dirty="0"/>
+              <a:t>Fase2 aberta</a:t>
+            </a:r>
+          </a:p>
+        </p:txBody>
+      </p:sp>
+      <p:sp>
+        <p:nvSpPr>
+          <p:cNvPr id="182" name="CaixaDeTexto 181">
+            <a:extLst>
+              <a:ext uri="{FF2B5EF4-FFF2-40B4-BE49-F238E27FC236}">
+                <a16:creationId xmlns:a16="http://schemas.microsoft.com/office/drawing/2014/main" id="{48C2AF2D-B958-460E-B07D-59B8498DE3EF}"/>
+              </a:ext>
+            </a:extLst>
+          </p:cNvPr>
+          <p:cNvSpPr txBox="1"/>
+          <p:nvPr/>
+        </p:nvSpPr>
+        <p:spPr>
+          <a:xfrm>
+            <a:off x="1285845" y="3817551"/>
+            <a:ext cx="1319592" cy="184666"/>
+          </a:xfrm>
+          <a:prstGeom prst="rect">
+            <a:avLst/>
+          </a:prstGeom>
+          <a:noFill/>
+        </p:spPr>
+        <p:txBody>
+          <a:bodyPr wrap="none" rtlCol="0">
+            <a:spAutoFit/>
+          </a:bodyPr>
+          <a:lstStyle/>
+          <a:p>
+            <a:r>
+              <a:rPr lang="pt-PT" sz="600" dirty="0"/>
+              <a:t>ImportaOUexporta &amp;&amp; Fase2 aberta</a:t>
+            </a:r>
+          </a:p>
+        </p:txBody>
+      </p:sp>
+      <p:sp>
+        <p:nvSpPr>
+          <p:cNvPr id="184" name="CaixaDeTexto 183">
+            <a:extLst>
+              <a:ext uri="{FF2B5EF4-FFF2-40B4-BE49-F238E27FC236}">
+                <a16:creationId xmlns:a16="http://schemas.microsoft.com/office/drawing/2014/main" id="{9EC14320-BAEC-4D37-BB01-C344256DE3D2}"/>
+              </a:ext>
+            </a:extLst>
+          </p:cNvPr>
+          <p:cNvSpPr txBox="1"/>
+          <p:nvPr/>
+        </p:nvSpPr>
+        <p:spPr>
+          <a:xfrm>
+            <a:off x="4222690" y="3489487"/>
+            <a:ext cx="1010213" cy="184666"/>
+          </a:xfrm>
+          <a:prstGeom prst="rect">
+            <a:avLst/>
+          </a:prstGeom>
+          <a:noFill/>
+        </p:spPr>
+        <p:txBody>
+          <a:bodyPr wrap="none" rtlCol="0">
+            <a:spAutoFit/>
+          </a:bodyPr>
+          <a:lstStyle/>
+          <a:p>
+            <a:r>
+              <a:rPr lang="pt-PT" sz="600" dirty="0"/>
+              <a:t>editaInfo &amp;&amp; Fase2 aberta</a:t>
+            </a:r>
+          </a:p>
+        </p:txBody>
+      </p:sp>
+      <p:sp>
+        <p:nvSpPr>
+          <p:cNvPr id="185" name="CaixaDeTexto 184">
+            <a:extLst>
+              <a:ext uri="{FF2B5EF4-FFF2-40B4-BE49-F238E27FC236}">
+                <a16:creationId xmlns:a16="http://schemas.microsoft.com/office/drawing/2014/main" id="{72E04D74-B839-4E9A-88B6-2F6819D21129}"/>
+              </a:ext>
+            </a:extLst>
+          </p:cNvPr>
+          <p:cNvSpPr txBox="1"/>
+          <p:nvPr/>
+        </p:nvSpPr>
+        <p:spPr>
+          <a:xfrm>
+            <a:off x="2367887" y="4465599"/>
+            <a:ext cx="579005" cy="184666"/>
+          </a:xfrm>
+          <a:prstGeom prst="rect">
+            <a:avLst/>
+          </a:prstGeom>
+          <a:noFill/>
+        </p:spPr>
+        <p:txBody>
+          <a:bodyPr wrap="none" rtlCol="0">
+            <a:spAutoFit/>
+          </a:bodyPr>
+          <a:lstStyle/>
+          <a:p>
+            <a:r>
+              <a:rPr lang="pt-PT" sz="600" dirty="0"/>
+              <a:t>mostraListas</a:t>
+            </a:r>
+          </a:p>
+        </p:txBody>
+      </p:sp>
+      <p:sp>
+        <p:nvSpPr>
+          <p:cNvPr id="186" name="CaixaDeTexto 185">
+            <a:extLst>
+              <a:ext uri="{FF2B5EF4-FFF2-40B4-BE49-F238E27FC236}">
+                <a16:creationId xmlns:a16="http://schemas.microsoft.com/office/drawing/2014/main" id="{E2C45B14-7A9E-45EC-9CBF-6607A8D0113A}"/>
+              </a:ext>
+            </a:extLst>
+          </p:cNvPr>
+          <p:cNvSpPr txBox="1"/>
+          <p:nvPr/>
+        </p:nvSpPr>
+        <p:spPr>
+          <a:xfrm>
+            <a:off x="4518319" y="3407865"/>
+            <a:ext cx="184731" cy="184666"/>
+          </a:xfrm>
+          <a:prstGeom prst="rect">
+            <a:avLst/>
+          </a:prstGeom>
+          <a:noFill/>
+        </p:spPr>
+        <p:txBody>
+          <a:bodyPr wrap="none" rtlCol="0">
+            <a:spAutoFit/>
+          </a:bodyPr>
+          <a:lstStyle/>
+          <a:p>
+            <a:endParaRPr lang="pt-PT" sz="600" dirty="0"/>
+          </a:p>
+        </p:txBody>
+      </p:sp>
+      <p:sp>
+        <p:nvSpPr>
+          <p:cNvPr id="187" name="CaixaDeTexto 186">
+            <a:extLst>
+              <a:ext uri="{FF2B5EF4-FFF2-40B4-BE49-F238E27FC236}">
+                <a16:creationId xmlns:a16="http://schemas.microsoft.com/office/drawing/2014/main" id="{713E4EC9-6693-4F2C-BE22-45C6995F380B}"/>
+              </a:ext>
+            </a:extLst>
+          </p:cNvPr>
+          <p:cNvSpPr txBox="1"/>
+          <p:nvPr/>
+        </p:nvSpPr>
+        <p:spPr>
+          <a:xfrm>
+            <a:off x="3143588" y="4878560"/>
+            <a:ext cx="587020" cy="184666"/>
+          </a:xfrm>
+          <a:prstGeom prst="rect">
+            <a:avLst/>
+          </a:prstGeom>
+          <a:noFill/>
+        </p:spPr>
+        <p:txBody>
+          <a:bodyPr wrap="none" rtlCol="0">
+            <a:spAutoFit/>
+          </a:bodyPr>
+          <a:lstStyle/>
+          <a:p>
+            <a:r>
+              <a:rPr lang="pt-PT" sz="600" dirty="0"/>
+              <a:t>Fase2 aberta</a:t>
+            </a:r>
+          </a:p>
+        </p:txBody>
+      </p:sp>
+      <p:sp>
+        <p:nvSpPr>
+          <p:cNvPr id="188" name="CaixaDeTexto 187">
+            <a:extLst>
+              <a:ext uri="{FF2B5EF4-FFF2-40B4-BE49-F238E27FC236}">
+                <a16:creationId xmlns:a16="http://schemas.microsoft.com/office/drawing/2014/main" id="{79E7F383-5BAD-4931-9F94-4BB040DBA39A}"/>
+              </a:ext>
+            </a:extLst>
+          </p:cNvPr>
+          <p:cNvSpPr txBox="1"/>
+          <p:nvPr/>
+        </p:nvSpPr>
+        <p:spPr>
+          <a:xfrm>
+            <a:off x="4408539" y="5293194"/>
+            <a:ext cx="587020" cy="276999"/>
+          </a:xfrm>
+          <a:prstGeom prst="rect">
+            <a:avLst/>
+          </a:prstGeom>
+          <a:noFill/>
+        </p:spPr>
+        <p:txBody>
+          <a:bodyPr wrap="none" rtlCol="0">
+            <a:spAutoFit/>
+          </a:bodyPr>
+          <a:lstStyle/>
+          <a:p>
+            <a:r>
+              <a:rPr lang="pt-PT" sz="600" dirty="0"/>
+              <a:t>return</a:t>
+            </a:r>
+          </a:p>
+          <a:p>
+            <a:r>
+              <a:rPr lang="pt-PT" sz="600" dirty="0"/>
+              <a:t>Fase3 aberta</a:t>
+            </a:r>
+          </a:p>
+        </p:txBody>
+      </p:sp>
+      <p:sp>
+        <p:nvSpPr>
+          <p:cNvPr id="190" name="CaixaDeTexto 189">
+            <a:extLst>
+              <a:ext uri="{FF2B5EF4-FFF2-40B4-BE49-F238E27FC236}">
+                <a16:creationId xmlns:a16="http://schemas.microsoft.com/office/drawing/2014/main" id="{58E1377C-3005-43DB-BA47-24EF3E08A2A5}"/>
+              </a:ext>
+            </a:extLst>
+          </p:cNvPr>
+          <p:cNvSpPr txBox="1"/>
+          <p:nvPr/>
+        </p:nvSpPr>
+        <p:spPr>
+          <a:xfrm>
+            <a:off x="3630826" y="4411419"/>
+            <a:ext cx="647934" cy="276999"/>
+          </a:xfrm>
+          <a:prstGeom prst="rect">
+            <a:avLst/>
+          </a:prstGeom>
+          <a:noFill/>
+        </p:spPr>
+        <p:txBody>
+          <a:bodyPr wrap="none" rtlCol="0">
+            <a:spAutoFit/>
+          </a:bodyPr>
+          <a:lstStyle/>
+          <a:p>
+            <a:r>
+              <a:rPr lang="pt-PT" sz="600" dirty="0"/>
+              <a:t>Fase2 fechada </a:t>
+            </a:r>
+          </a:p>
+          <a:p>
+            <a:r>
+              <a:rPr lang="pt-PT" sz="600" dirty="0"/>
+              <a:t>Fase1 fechada</a:t>
+            </a:r>
+          </a:p>
+        </p:txBody>
+      </p:sp>
+      <p:sp>
+        <p:nvSpPr>
+          <p:cNvPr id="192" name="CaixaDeTexto 191">
+            <a:extLst>
+              <a:ext uri="{FF2B5EF4-FFF2-40B4-BE49-F238E27FC236}">
+                <a16:creationId xmlns:a16="http://schemas.microsoft.com/office/drawing/2014/main" id="{5BC4F4BD-46E8-4DD7-947C-FA61A4160DC4}"/>
+              </a:ext>
+            </a:extLst>
+          </p:cNvPr>
+          <p:cNvSpPr txBox="1"/>
+          <p:nvPr/>
+        </p:nvSpPr>
+        <p:spPr>
+          <a:xfrm>
+            <a:off x="2272409" y="5480690"/>
+            <a:ext cx="1010213" cy="184666"/>
+          </a:xfrm>
+          <a:prstGeom prst="rect">
+            <a:avLst/>
+          </a:prstGeom>
+          <a:noFill/>
+        </p:spPr>
+        <p:txBody>
+          <a:bodyPr wrap="none" rtlCol="0">
+            <a:spAutoFit/>
+          </a:bodyPr>
+          <a:lstStyle/>
+          <a:p>
+            <a:r>
+              <a:rPr lang="pt-PT" sz="600" dirty="0"/>
+              <a:t>editaInfo &amp;&amp; Fase3 aberta</a:t>
+            </a:r>
+          </a:p>
+        </p:txBody>
+      </p:sp>
+      <p:sp>
+        <p:nvSpPr>
+          <p:cNvPr id="193" name="CaixaDeTexto 192">
+            <a:extLst>
+              <a:ext uri="{FF2B5EF4-FFF2-40B4-BE49-F238E27FC236}">
+                <a16:creationId xmlns:a16="http://schemas.microsoft.com/office/drawing/2014/main" id="{E318FC00-A4E0-4C60-840B-F34A97A9FE35}"/>
+              </a:ext>
+            </a:extLst>
+          </p:cNvPr>
+          <p:cNvSpPr txBox="1"/>
+          <p:nvPr/>
+        </p:nvSpPr>
+        <p:spPr>
+          <a:xfrm>
+            <a:off x="2282510" y="6587616"/>
+            <a:ext cx="579005" cy="184666"/>
+          </a:xfrm>
+          <a:prstGeom prst="rect">
+            <a:avLst/>
+          </a:prstGeom>
+          <a:noFill/>
+        </p:spPr>
+        <p:txBody>
+          <a:bodyPr wrap="none" rtlCol="0">
+            <a:spAutoFit/>
+          </a:bodyPr>
+          <a:lstStyle/>
+          <a:p>
+            <a:r>
+              <a:rPr lang="pt-PT" sz="600" dirty="0"/>
+              <a:t>mostraListas</a:t>
+            </a:r>
+          </a:p>
+        </p:txBody>
+      </p:sp>
+      <p:sp>
+        <p:nvSpPr>
+          <p:cNvPr id="194" name="CaixaDeTexto 193">
+            <a:extLst>
+              <a:ext uri="{FF2B5EF4-FFF2-40B4-BE49-F238E27FC236}">
+                <a16:creationId xmlns:a16="http://schemas.microsoft.com/office/drawing/2014/main" id="{C2D3E42D-49EA-40CB-BB18-331F9DBF655E}"/>
+              </a:ext>
+            </a:extLst>
+          </p:cNvPr>
+          <p:cNvSpPr txBox="1"/>
+          <p:nvPr/>
+        </p:nvSpPr>
+        <p:spPr>
+          <a:xfrm>
+            <a:off x="4481406" y="5990454"/>
+            <a:ext cx="1402948" cy="184666"/>
+          </a:xfrm>
+          <a:prstGeom prst="rect">
+            <a:avLst/>
+          </a:prstGeom>
+          <a:noFill/>
+        </p:spPr>
+        <p:txBody>
+          <a:bodyPr wrap="none" rtlCol="0">
+            <a:spAutoFit/>
+          </a:bodyPr>
+          <a:lstStyle/>
+          <a:p>
+            <a:r>
+              <a:rPr lang="pt-PT" sz="600" dirty="0"/>
+              <a:t>atribuicaoAutomatica &amp;&amp; Fase3 aberta</a:t>
+            </a:r>
+          </a:p>
+        </p:txBody>
+      </p:sp>
+      <p:sp>
+        <p:nvSpPr>
+          <p:cNvPr id="195" name="CaixaDeTexto 194">
+            <a:extLst>
+              <a:ext uri="{FF2B5EF4-FFF2-40B4-BE49-F238E27FC236}">
+                <a16:creationId xmlns:a16="http://schemas.microsoft.com/office/drawing/2014/main" id="{5FDADF33-23CE-4371-9EF7-D0CC2F4F2DB2}"/>
+              </a:ext>
+            </a:extLst>
+          </p:cNvPr>
+          <p:cNvSpPr txBox="1"/>
+          <p:nvPr/>
+        </p:nvSpPr>
+        <p:spPr>
+          <a:xfrm>
+            <a:off x="6104923" y="5292780"/>
+            <a:ext cx="623392" cy="276999"/>
+          </a:xfrm>
+          <a:prstGeom prst="rect">
+            <a:avLst/>
+          </a:prstGeom>
+          <a:noFill/>
+        </p:spPr>
+        <p:txBody>
+          <a:bodyPr wrap="square" rtlCol="0">
+            <a:spAutoFit/>
+          </a:bodyPr>
+          <a:lstStyle/>
+          <a:p>
+            <a:r>
+              <a:rPr lang="pt-PT" sz="600" dirty="0"/>
+              <a:t>desempate &amp; nEmpates =0</a:t>
+            </a:r>
+          </a:p>
+        </p:txBody>
+      </p:sp>
+      <p:sp>
+        <p:nvSpPr>
+          <p:cNvPr id="196" name="CaixaDeTexto 195">
+            <a:extLst>
+              <a:ext uri="{FF2B5EF4-FFF2-40B4-BE49-F238E27FC236}">
+                <a16:creationId xmlns:a16="http://schemas.microsoft.com/office/drawing/2014/main" id="{90F0A1DB-054F-4078-A542-AC7B33716B50}"/>
+              </a:ext>
+            </a:extLst>
+          </p:cNvPr>
+          <p:cNvSpPr txBox="1"/>
+          <p:nvPr/>
+        </p:nvSpPr>
+        <p:spPr>
+          <a:xfrm>
+            <a:off x="5442461" y="3918374"/>
+            <a:ext cx="623392" cy="276999"/>
+          </a:xfrm>
+          <a:prstGeom prst="rect">
+            <a:avLst/>
+          </a:prstGeom>
+          <a:noFill/>
+        </p:spPr>
+        <p:txBody>
+          <a:bodyPr wrap="square" rtlCol="0">
+            <a:spAutoFit/>
+          </a:bodyPr>
+          <a:lstStyle/>
+          <a:p>
+            <a:r>
+              <a:rPr lang="pt-PT" sz="600" dirty="0"/>
+              <a:t>desempate &amp; nEmpates &gt; 0</a:t>
+            </a:r>
+          </a:p>
+        </p:txBody>
+      </p:sp>
+      <p:sp>
+        <p:nvSpPr>
+          <p:cNvPr id="197" name="CaixaDeTexto 196">
+            <a:extLst>
+              <a:ext uri="{FF2B5EF4-FFF2-40B4-BE49-F238E27FC236}">
+                <a16:creationId xmlns:a16="http://schemas.microsoft.com/office/drawing/2014/main" id="{426F2FE4-183D-414E-BDEB-D41F7807489B}"/>
+              </a:ext>
+            </a:extLst>
+          </p:cNvPr>
+          <p:cNvSpPr txBox="1"/>
+          <p:nvPr/>
+        </p:nvSpPr>
+        <p:spPr>
+          <a:xfrm>
+            <a:off x="3121466" y="7107968"/>
+            <a:ext cx="587020" cy="184666"/>
+          </a:xfrm>
+          <a:prstGeom prst="rect">
+            <a:avLst/>
+          </a:prstGeom>
+          <a:noFill/>
+        </p:spPr>
+        <p:txBody>
+          <a:bodyPr wrap="none" rtlCol="0">
+            <a:spAutoFit/>
+          </a:bodyPr>
+          <a:lstStyle/>
+          <a:p>
+            <a:r>
+              <a:rPr lang="pt-PT" sz="600" dirty="0"/>
+              <a:t>Fase3 aberta</a:t>
+            </a:r>
+          </a:p>
+        </p:txBody>
+      </p:sp>
+      <p:sp>
+        <p:nvSpPr>
+          <p:cNvPr id="198" name="CaixaDeTexto 197">
+            <a:extLst>
+              <a:ext uri="{FF2B5EF4-FFF2-40B4-BE49-F238E27FC236}">
+                <a16:creationId xmlns:a16="http://schemas.microsoft.com/office/drawing/2014/main" id="{9BA38E07-895D-44F4-8FDA-E1F6A19D3E21}"/>
+              </a:ext>
+            </a:extLst>
+          </p:cNvPr>
+          <p:cNvSpPr txBox="1"/>
+          <p:nvPr/>
+        </p:nvSpPr>
+        <p:spPr>
+          <a:xfrm>
+            <a:off x="3789828" y="7402158"/>
+            <a:ext cx="1366292" cy="461665"/>
+          </a:xfrm>
+          <a:prstGeom prst="rect">
+            <a:avLst/>
+          </a:prstGeom>
+          <a:noFill/>
+        </p:spPr>
+        <p:txBody>
+          <a:bodyPr wrap="square" rtlCol="0">
+            <a:spAutoFit/>
+          </a:bodyPr>
+          <a:lstStyle/>
+          <a:p>
+            <a:r>
+              <a:rPr lang="pt-PT" sz="600" dirty="0"/>
+              <a:t>Fase3 fechada </a:t>
+            </a:r>
+          </a:p>
+          <a:p>
+            <a:r>
+              <a:rPr lang="pt-PT" sz="600" dirty="0"/>
+              <a:t>nCandidaturas &gt;= nPropostas</a:t>
+            </a:r>
+          </a:p>
+          <a:p>
+            <a:r>
+              <a:rPr lang="pt-PT" sz="600" dirty="0"/>
+              <a:t>Se não estiverem, </a:t>
+            </a:r>
+          </a:p>
+          <a:p>
+            <a:r>
+              <a:rPr lang="pt-PT" sz="600" dirty="0"/>
+              <a:t>fechar fases anteriores</a:t>
+            </a:r>
+          </a:p>
+        </p:txBody>
+      </p:sp>
+      <p:sp>
+        <p:nvSpPr>
+          <p:cNvPr id="199" name="CaixaDeTexto 198">
+            <a:extLst>
+              <a:ext uri="{FF2B5EF4-FFF2-40B4-BE49-F238E27FC236}">
+                <a16:creationId xmlns:a16="http://schemas.microsoft.com/office/drawing/2014/main" id="{FA4275B6-304E-456E-A390-E50D8FEE9263}"/>
+              </a:ext>
+            </a:extLst>
+          </p:cNvPr>
+          <p:cNvSpPr txBox="1"/>
+          <p:nvPr/>
+        </p:nvSpPr>
+        <p:spPr>
+          <a:xfrm>
+            <a:off x="5187693" y="6923302"/>
+            <a:ext cx="587020" cy="276999"/>
+          </a:xfrm>
+          <a:prstGeom prst="rect">
+            <a:avLst/>
+          </a:prstGeom>
+          <a:noFill/>
+        </p:spPr>
+        <p:txBody>
+          <a:bodyPr wrap="none" rtlCol="0">
+            <a:spAutoFit/>
+          </a:bodyPr>
+          <a:lstStyle/>
+          <a:p>
+            <a:r>
+              <a:rPr lang="pt-PT" sz="600" dirty="0"/>
+              <a:t>return</a:t>
+            </a:r>
+          </a:p>
+          <a:p>
+            <a:r>
+              <a:rPr lang="pt-PT" sz="600" dirty="0"/>
+              <a:t>Fase4 aberta</a:t>
+            </a:r>
+          </a:p>
+        </p:txBody>
+      </p:sp>
+      <p:sp>
+        <p:nvSpPr>
+          <p:cNvPr id="200" name="CaixaDeTexto 199">
+            <a:extLst>
+              <a:ext uri="{FF2B5EF4-FFF2-40B4-BE49-F238E27FC236}">
+                <a16:creationId xmlns:a16="http://schemas.microsoft.com/office/drawing/2014/main" id="{EE49DB90-B271-41A6-88FE-C710E603EB8F}"/>
+              </a:ext>
+            </a:extLst>
+          </p:cNvPr>
+          <p:cNvSpPr txBox="1"/>
+          <p:nvPr/>
+        </p:nvSpPr>
+        <p:spPr>
+          <a:xfrm>
+            <a:off x="2589702" y="8957303"/>
+            <a:ext cx="649537" cy="200055"/>
+          </a:xfrm>
+          <a:prstGeom prst="rect">
+            <a:avLst/>
+          </a:prstGeom>
+          <a:noFill/>
+        </p:spPr>
+        <p:txBody>
+          <a:bodyPr wrap="none" rtlCol="0">
+            <a:spAutoFit/>
+          </a:bodyPr>
+          <a:lstStyle/>
+          <a:p>
+            <a:r>
+              <a:rPr lang="pt-PT" sz="700" dirty="0"/>
+              <a:t>mostraListas</a:t>
+            </a:r>
+          </a:p>
+        </p:txBody>
+      </p:sp>
+      <p:sp>
+        <p:nvSpPr>
+          <p:cNvPr id="201" name="CaixaDeTexto 200">
+            <a:extLst>
+              <a:ext uri="{FF2B5EF4-FFF2-40B4-BE49-F238E27FC236}">
+                <a16:creationId xmlns:a16="http://schemas.microsoft.com/office/drawing/2014/main" id="{94484B18-2D57-47E2-A723-4F7CB419B9A5}"/>
+              </a:ext>
+            </a:extLst>
+          </p:cNvPr>
+          <p:cNvSpPr txBox="1"/>
+          <p:nvPr/>
+        </p:nvSpPr>
+        <p:spPr>
+          <a:xfrm>
+            <a:off x="2287901" y="7757689"/>
+            <a:ext cx="1010213" cy="184666"/>
+          </a:xfrm>
+          <a:prstGeom prst="rect">
+            <a:avLst/>
+          </a:prstGeom>
+          <a:noFill/>
+        </p:spPr>
+        <p:txBody>
+          <a:bodyPr wrap="none" rtlCol="0">
+            <a:spAutoFit/>
+          </a:bodyPr>
+          <a:lstStyle/>
+          <a:p>
+            <a:r>
+              <a:rPr lang="pt-PT" sz="600" dirty="0"/>
+              <a:t>editaInfo &amp;&amp; Fase4 aberta</a:t>
+            </a:r>
+          </a:p>
+        </p:txBody>
+      </p:sp>
+      <p:sp>
+        <p:nvSpPr>
+          <p:cNvPr id="202" name="CaixaDeTexto 201">
+            <a:extLst>
+              <a:ext uri="{FF2B5EF4-FFF2-40B4-BE49-F238E27FC236}">
+                <a16:creationId xmlns:a16="http://schemas.microsoft.com/office/drawing/2014/main" id="{EA0BD39B-2B29-4123-932F-4755C81D2520}"/>
+              </a:ext>
+            </a:extLst>
+          </p:cNvPr>
+          <p:cNvSpPr txBox="1"/>
+          <p:nvPr/>
+        </p:nvSpPr>
+        <p:spPr>
+          <a:xfrm>
+            <a:off x="4255371" y="8657867"/>
+            <a:ext cx="1614545" cy="200055"/>
+          </a:xfrm>
+          <a:prstGeom prst="rect">
+            <a:avLst/>
+          </a:prstGeom>
+          <a:noFill/>
+        </p:spPr>
+        <p:txBody>
+          <a:bodyPr wrap="none" rtlCol="0">
+            <a:spAutoFit/>
+          </a:bodyPr>
+          <a:lstStyle/>
+          <a:p>
+            <a:r>
+              <a:rPr lang="pt-PT" sz="700" dirty="0"/>
+              <a:t>atribuicaoAutomatica &amp;&amp; Fase2 aberta</a:t>
+            </a:r>
+          </a:p>
+        </p:txBody>
+      </p:sp>
+      <p:sp>
+        <p:nvSpPr>
+          <p:cNvPr id="203" name="CaixaDeTexto 202">
+            <a:extLst>
+              <a:ext uri="{FF2B5EF4-FFF2-40B4-BE49-F238E27FC236}">
+                <a16:creationId xmlns:a16="http://schemas.microsoft.com/office/drawing/2014/main" id="{4E879942-B7FF-4103-945C-CAF302568B20}"/>
+              </a:ext>
+            </a:extLst>
+          </p:cNvPr>
+          <p:cNvSpPr txBox="1"/>
+          <p:nvPr/>
+        </p:nvSpPr>
+        <p:spPr>
+          <a:xfrm>
+            <a:off x="4428055" y="9555914"/>
+            <a:ext cx="649537" cy="200055"/>
+          </a:xfrm>
+          <a:prstGeom prst="rect">
+            <a:avLst/>
+          </a:prstGeom>
+          <a:noFill/>
+        </p:spPr>
+        <p:txBody>
+          <a:bodyPr wrap="none" rtlCol="0">
+            <a:spAutoFit/>
+          </a:bodyPr>
+          <a:lstStyle/>
+          <a:p>
+            <a:r>
+              <a:rPr lang="pt-PT" sz="700" dirty="0"/>
+              <a:t>mostraListas</a:t>
+            </a:r>
+          </a:p>
+        </p:txBody>
+      </p:sp>
+      <p:sp>
+        <p:nvSpPr>
+          <p:cNvPr id="207" name="CaixaDeTexto 206">
+            <a:extLst>
+              <a:ext uri="{FF2B5EF4-FFF2-40B4-BE49-F238E27FC236}">
+                <a16:creationId xmlns:a16="http://schemas.microsoft.com/office/drawing/2014/main" id="{D1B3B64E-3F8C-4AAD-917B-4362E567E92A}"/>
+              </a:ext>
+            </a:extLst>
+          </p:cNvPr>
+          <p:cNvSpPr txBox="1"/>
+          <p:nvPr/>
+        </p:nvSpPr>
+        <p:spPr>
+          <a:xfrm>
+            <a:off x="1349216" y="9547481"/>
+            <a:ext cx="641522" cy="200055"/>
+          </a:xfrm>
+          <a:prstGeom prst="rect">
+            <a:avLst/>
+          </a:prstGeom>
+          <a:noFill/>
+        </p:spPr>
+        <p:txBody>
+          <a:bodyPr wrap="none" rtlCol="0">
+            <a:spAutoFit/>
+          </a:bodyPr>
+          <a:lstStyle/>
+          <a:p>
+            <a:r>
+              <a:rPr lang="pt-PT" sz="700" dirty="0"/>
+              <a:t>exportarCVS</a:t>
+            </a:r>
+            <a:endParaRPr lang="pt-PT" sz="800" dirty="0"/>
+          </a:p>
+        </p:txBody>
+      </p:sp>
+      <p:sp>
+        <p:nvSpPr>
+          <p:cNvPr id="208" name="CaixaDeTexto 207">
+            <a:extLst>
+              <a:ext uri="{FF2B5EF4-FFF2-40B4-BE49-F238E27FC236}">
+                <a16:creationId xmlns:a16="http://schemas.microsoft.com/office/drawing/2014/main" id="{0979CD62-0A44-44AD-8606-8A0C2642DD7E}"/>
+              </a:ext>
+            </a:extLst>
+          </p:cNvPr>
+          <p:cNvSpPr txBox="1"/>
+          <p:nvPr/>
+        </p:nvSpPr>
+        <p:spPr>
+          <a:xfrm>
+            <a:off x="1249378" y="8185433"/>
+            <a:ext cx="641522" cy="200055"/>
+          </a:xfrm>
+          <a:prstGeom prst="rect">
+            <a:avLst/>
+          </a:prstGeom>
+          <a:noFill/>
+        </p:spPr>
+        <p:txBody>
+          <a:bodyPr wrap="none" rtlCol="0">
+            <a:spAutoFit/>
+          </a:bodyPr>
+          <a:lstStyle/>
+          <a:p>
+            <a:r>
+              <a:rPr lang="pt-PT" sz="700" dirty="0"/>
+              <a:t>exportarCVS</a:t>
+            </a:r>
+            <a:endParaRPr lang="pt-PT" sz="800" dirty="0"/>
+          </a:p>
+        </p:txBody>
+      </p:sp>
+      <p:sp>
+        <p:nvSpPr>
+          <p:cNvPr id="209" name="CaixaDeTexto 208">
+            <a:extLst>
+              <a:ext uri="{FF2B5EF4-FFF2-40B4-BE49-F238E27FC236}">
+                <a16:creationId xmlns:a16="http://schemas.microsoft.com/office/drawing/2014/main" id="{CB390CE8-B0D6-4789-B294-8B2A3608BEB8}"/>
+              </a:ext>
+            </a:extLst>
+          </p:cNvPr>
+          <p:cNvSpPr txBox="1"/>
+          <p:nvPr/>
+        </p:nvSpPr>
+        <p:spPr>
+          <a:xfrm>
+            <a:off x="3383353" y="9020606"/>
+            <a:ext cx="630301" cy="184666"/>
+          </a:xfrm>
+          <a:prstGeom prst="rect">
+            <a:avLst/>
+          </a:prstGeom>
+          <a:noFill/>
+        </p:spPr>
+        <p:txBody>
+          <a:bodyPr wrap="none" rtlCol="0">
+            <a:spAutoFit/>
+          </a:bodyPr>
+          <a:lstStyle/>
+          <a:p>
+            <a:r>
+              <a:rPr lang="pt-PT" sz="600" dirty="0"/>
+              <a:t>Fase4 fechada</a:t>
+            </a:r>
+          </a:p>
+        </p:txBody>
+      </p:sp>
+      <p:sp>
+        <p:nvSpPr>
+          <p:cNvPr id="210" name="CaixaDeTexto 209">
+            <a:extLst>
+              <a:ext uri="{FF2B5EF4-FFF2-40B4-BE49-F238E27FC236}">
+                <a16:creationId xmlns:a16="http://schemas.microsoft.com/office/drawing/2014/main" id="{9FE5160F-D613-4E45-A156-544D79F76F33}"/>
+              </a:ext>
+            </a:extLst>
+          </p:cNvPr>
+          <p:cNvSpPr txBox="1"/>
+          <p:nvPr/>
+        </p:nvSpPr>
+        <p:spPr>
+          <a:xfrm>
+            <a:off x="1311448" y="5856352"/>
+            <a:ext cx="1319592" cy="184666"/>
+          </a:xfrm>
+          <a:prstGeom prst="rect">
+            <a:avLst/>
+          </a:prstGeom>
+          <a:noFill/>
+        </p:spPr>
+        <p:txBody>
+          <a:bodyPr wrap="none" rtlCol="0">
+            <a:spAutoFit/>
+          </a:bodyPr>
+          <a:lstStyle/>
+          <a:p>
+            <a:r>
+              <a:rPr lang="pt-PT" sz="600" dirty="0"/>
+              <a:t>ImportaOUexporta &amp;&amp; Fase3 aberta</a:t>
+            </a:r>
+          </a:p>
+        </p:txBody>
+      </p:sp>
+      <p:sp>
+        <p:nvSpPr>
+          <p:cNvPr id="74" name="CaixaDeTexto 73">
+            <a:extLst>
+              <a:ext uri="{FF2B5EF4-FFF2-40B4-BE49-F238E27FC236}">
+                <a16:creationId xmlns:a16="http://schemas.microsoft.com/office/drawing/2014/main" id="{A1C96DBF-ABD0-45ED-826E-05D6AC918B29}"/>
+              </a:ext>
+            </a:extLst>
+          </p:cNvPr>
+          <p:cNvSpPr txBox="1"/>
+          <p:nvPr/>
+        </p:nvSpPr>
+        <p:spPr>
+          <a:xfrm>
+            <a:off x="2906644" y="1453945"/>
+            <a:ext cx="777777" cy="276999"/>
+          </a:xfrm>
+          <a:prstGeom prst="rect">
+            <a:avLst/>
+          </a:prstGeom>
+          <a:noFill/>
+        </p:spPr>
+        <p:txBody>
+          <a:bodyPr wrap="none" rtlCol="0">
+            <a:spAutoFit/>
+          </a:bodyPr>
+          <a:lstStyle/>
+          <a:p>
+            <a:pPr algn="r"/>
+            <a:r>
+              <a:rPr lang="pt-PT" sz="600" dirty="0"/>
+              <a:t>editaInfoDocentes </a:t>
+            </a:r>
+          </a:p>
+          <a:p>
+            <a:pPr algn="r"/>
+            <a:r>
+              <a:rPr lang="pt-PT" sz="600" dirty="0"/>
+              <a:t> &amp;&amp; Fase1 aberta</a:t>
+            </a:r>
+          </a:p>
+        </p:txBody>
+      </p:sp>
+      <p:sp>
+        <p:nvSpPr>
+          <p:cNvPr id="77" name="CaixaDeTexto 76">
+            <a:extLst>
+              <a:ext uri="{FF2B5EF4-FFF2-40B4-BE49-F238E27FC236}">
+                <a16:creationId xmlns:a16="http://schemas.microsoft.com/office/drawing/2014/main" id="{35D9D366-6DFA-486C-9F73-87A756DB8110}"/>
+              </a:ext>
+            </a:extLst>
+          </p:cNvPr>
+          <p:cNvSpPr txBox="1"/>
+          <p:nvPr/>
+        </p:nvSpPr>
+        <p:spPr>
+          <a:xfrm>
+            <a:off x="3732213" y="1609837"/>
+            <a:ext cx="1533525" cy="200055"/>
+          </a:xfrm>
+          <a:prstGeom prst="rect">
+            <a:avLst/>
+          </a:prstGeom>
+          <a:noFill/>
+        </p:spPr>
+        <p:txBody>
+          <a:bodyPr wrap="square" rtlCol="0">
+            <a:spAutoFit/>
+          </a:bodyPr>
+          <a:lstStyle/>
+          <a:p>
+            <a:r>
+              <a:rPr lang="pt-PT" sz="700" dirty="0"/>
+              <a:t>editaInfoPropostas &amp;&amp; Fase1 aberta</a:t>
+            </a:r>
+          </a:p>
+        </p:txBody>
+      </p:sp>
+      <p:sp>
+        <p:nvSpPr>
+          <p:cNvPr id="80" name="Retângulo: Cantos Arredondados 79">
+            <a:extLst>
+              <a:ext uri="{FF2B5EF4-FFF2-40B4-BE49-F238E27FC236}">
+                <a16:creationId xmlns:a16="http://schemas.microsoft.com/office/drawing/2014/main" id="{16F94965-942E-4C6D-9EC5-D311C6D39C01}"/>
+              </a:ext>
+            </a:extLst>
+          </p:cNvPr>
+          <p:cNvSpPr/>
+          <p:nvPr/>
+        </p:nvSpPr>
+        <p:spPr>
+          <a:xfrm>
+            <a:off x="1246188" y="1173240"/>
+            <a:ext cx="914400" cy="406835"/>
           </a:xfrm>
           <a:prstGeom prst="roundRect">
             <a:avLst/>
@@ -4922,18 +6110,412 @@
           <a:p>
             <a:pPr algn="ctr"/>
             <a:r>
-              <a:rPr lang="pt-PT" sz="1400" dirty="0"/>
-              <a:t>Diagrama de Estados </a:t>
-            </a:r>
-          </a:p>
-        </p:txBody>
-      </p:sp>
-      <p:sp>
-        <p:nvSpPr>
-          <p:cNvPr id="171" name="CaixaDeTexto 170">
-            <a:extLst>
-              <a:ext uri="{FF2B5EF4-FFF2-40B4-BE49-F238E27FC236}">
-                <a16:creationId xmlns:a16="http://schemas.microsoft.com/office/drawing/2014/main" id="{86725331-0997-40B1-9F3D-7D5C12355338}"/>
+              <a:rPr lang="pt-PT" sz="1000" dirty="0"/>
+              <a:t>ModoAlunos</a:t>
+            </a:r>
+          </a:p>
+          <a:p>
+            <a:pPr algn="ctr"/>
+            <a:r>
+              <a:rPr lang="pt-PT" sz="600" dirty="0">
+                <a:solidFill>
+                  <a:srgbClr val="C00000"/>
+                </a:solidFill>
+              </a:rPr>
+              <a:t>Fase1</a:t>
+            </a:r>
+          </a:p>
+        </p:txBody>
+      </p:sp>
+      <p:sp>
+        <p:nvSpPr>
+          <p:cNvPr id="81" name="Retângulo: Cantos Arredondados 80">
+            <a:extLst>
+              <a:ext uri="{FF2B5EF4-FFF2-40B4-BE49-F238E27FC236}">
+                <a16:creationId xmlns:a16="http://schemas.microsoft.com/office/drawing/2014/main" id="{FEF86703-AE6C-4909-A514-521CC8038623}"/>
+              </a:ext>
+            </a:extLst>
+          </p:cNvPr>
+          <p:cNvSpPr/>
+          <p:nvPr/>
+        </p:nvSpPr>
+        <p:spPr>
+          <a:xfrm>
+            <a:off x="2663825" y="997030"/>
+            <a:ext cx="1028700" cy="406835"/>
+          </a:xfrm>
+          <a:prstGeom prst="roundRect">
+            <a:avLst/>
+          </a:prstGeom>
+        </p:spPr>
+        <p:style>
+          <a:lnRef idx="1">
+            <a:schemeClr val="accent3"/>
+          </a:lnRef>
+          <a:fillRef idx="2">
+            <a:schemeClr val="accent3"/>
+          </a:fillRef>
+          <a:effectRef idx="1">
+            <a:schemeClr val="accent3"/>
+          </a:effectRef>
+          <a:fontRef idx="minor">
+            <a:schemeClr val="dk1"/>
+          </a:fontRef>
+        </p:style>
+        <p:txBody>
+          <a:bodyPr rtlCol="0" anchor="ctr"/>
+          <a:lstStyle/>
+          <a:p>
+            <a:pPr algn="ctr"/>
+            <a:r>
+              <a:rPr lang="pt-PT" sz="1000" dirty="0"/>
+              <a:t>ModoDocentes</a:t>
+            </a:r>
+          </a:p>
+          <a:p>
+            <a:pPr algn="ctr"/>
+            <a:r>
+              <a:rPr lang="pt-PT" sz="600" dirty="0">
+                <a:solidFill>
+                  <a:srgbClr val="C00000"/>
+                </a:solidFill>
+              </a:rPr>
+              <a:t>Fase1</a:t>
+            </a:r>
+          </a:p>
+        </p:txBody>
+      </p:sp>
+      <p:sp>
+        <p:nvSpPr>
+          <p:cNvPr id="82" name="Retângulo: Cantos Arredondados 81">
+            <a:extLst>
+              <a:ext uri="{FF2B5EF4-FFF2-40B4-BE49-F238E27FC236}">
+                <a16:creationId xmlns:a16="http://schemas.microsoft.com/office/drawing/2014/main" id="{033EDB9D-475F-4C54-BD21-FD9B1062D4A0}"/>
+              </a:ext>
+            </a:extLst>
+          </p:cNvPr>
+          <p:cNvSpPr/>
+          <p:nvPr/>
+        </p:nvSpPr>
+        <p:spPr>
+          <a:xfrm>
+            <a:off x="5322887" y="1597103"/>
+            <a:ext cx="1162049" cy="406835"/>
+          </a:xfrm>
+          <a:prstGeom prst="roundRect">
+            <a:avLst/>
+          </a:prstGeom>
+        </p:spPr>
+        <p:style>
+          <a:lnRef idx="1">
+            <a:schemeClr val="accent3"/>
+          </a:lnRef>
+          <a:fillRef idx="2">
+            <a:schemeClr val="accent3"/>
+          </a:fillRef>
+          <a:effectRef idx="1">
+            <a:schemeClr val="accent3"/>
+          </a:effectRef>
+          <a:fontRef idx="minor">
+            <a:schemeClr val="dk1"/>
+          </a:fontRef>
+        </p:style>
+        <p:txBody>
+          <a:bodyPr rtlCol="0" anchor="ctr"/>
+          <a:lstStyle/>
+          <a:p>
+            <a:pPr algn="ctr"/>
+            <a:r>
+              <a:rPr lang="pt-PT" sz="1000" dirty="0"/>
+              <a:t>ModoPropostas</a:t>
+            </a:r>
+          </a:p>
+          <a:p>
+            <a:pPr algn="ctr"/>
+            <a:r>
+              <a:rPr lang="pt-PT" sz="600" dirty="0">
+                <a:solidFill>
+                  <a:srgbClr val="C00000"/>
+                </a:solidFill>
+              </a:rPr>
+              <a:t>Fase1</a:t>
+            </a:r>
+          </a:p>
+        </p:txBody>
+      </p:sp>
+      <p:cxnSp>
+        <p:nvCxnSpPr>
+          <p:cNvPr id="19" name="Conexão: Ângulo Reto 18">
+            <a:extLst>
+              <a:ext uri="{FF2B5EF4-FFF2-40B4-BE49-F238E27FC236}">
+                <a16:creationId xmlns:a16="http://schemas.microsoft.com/office/drawing/2014/main" id="{2E31F839-22A2-46D9-85C5-A53CE445B1F2}"/>
+              </a:ext>
+            </a:extLst>
+          </p:cNvPr>
+          <p:cNvCxnSpPr>
+            <a:cxnSpLocks/>
+          </p:cNvCxnSpPr>
+          <p:nvPr/>
+        </p:nvCxnSpPr>
+        <p:spPr>
+          <a:xfrm flipV="1">
+            <a:off x="3454400" y="1787821"/>
+            <a:ext cx="1868487" cy="301329"/>
+          </a:xfrm>
+          <a:prstGeom prst="bentConnector3">
+            <a:avLst>
+              <a:gd name="adj1" fmla="val 15335"/>
+            </a:avLst>
+          </a:prstGeom>
+          <a:ln>
+            <a:tailEnd type="triangle"/>
+          </a:ln>
+        </p:spPr>
+        <p:style>
+          <a:lnRef idx="1">
+            <a:schemeClr val="accent3"/>
+          </a:lnRef>
+          <a:fillRef idx="0">
+            <a:schemeClr val="accent3"/>
+          </a:fillRef>
+          <a:effectRef idx="0">
+            <a:schemeClr val="accent3"/>
+          </a:effectRef>
+          <a:fontRef idx="minor">
+            <a:schemeClr val="tx1"/>
+          </a:fontRef>
+        </p:style>
+      </p:cxnSp>
+      <p:sp>
+        <p:nvSpPr>
+          <p:cNvPr id="97" name="Seta: Curvada Para Cima 96">
+            <a:extLst>
+              <a:ext uri="{FF2B5EF4-FFF2-40B4-BE49-F238E27FC236}">
+                <a16:creationId xmlns:a16="http://schemas.microsoft.com/office/drawing/2014/main" id="{2CDBB7E9-D6F2-45B4-8D3B-DEE824AB91B6}"/>
+              </a:ext>
+            </a:extLst>
+          </p:cNvPr>
+          <p:cNvSpPr/>
+          <p:nvPr/>
+        </p:nvSpPr>
+        <p:spPr>
+          <a:xfrm rot="12640880">
+            <a:off x="3489218" y="839757"/>
+            <a:ext cx="333471" cy="213717"/>
+          </a:xfrm>
+          <a:prstGeom prst="curvedUpArrow">
+            <a:avLst>
+              <a:gd name="adj1" fmla="val 5816"/>
+              <a:gd name="adj2" fmla="val 27233"/>
+              <a:gd name="adj3" fmla="val 17697"/>
+            </a:avLst>
+          </a:prstGeom>
+          <a:ln/>
+        </p:spPr>
+        <p:style>
+          <a:lnRef idx="1">
+            <a:schemeClr val="accent3"/>
+          </a:lnRef>
+          <a:fillRef idx="2">
+            <a:schemeClr val="accent3"/>
+          </a:fillRef>
+          <a:effectRef idx="1">
+            <a:schemeClr val="accent3"/>
+          </a:effectRef>
+          <a:fontRef idx="minor">
+            <a:schemeClr val="dk1"/>
+          </a:fontRef>
+        </p:style>
+        <p:txBody>
+          <a:bodyPr rtlCol="0" anchor="ctr"/>
+          <a:lstStyle/>
+          <a:p>
+            <a:pPr algn="ctr"/>
+            <a:endParaRPr lang="pt-PT" dirty="0">
+              <a:solidFill>
+                <a:schemeClr val="tx1"/>
+              </a:solidFill>
+            </a:endParaRPr>
+          </a:p>
+        </p:txBody>
+      </p:sp>
+      <p:cxnSp>
+        <p:nvCxnSpPr>
+          <p:cNvPr id="88" name="Conexão: Ângulo Reto 87">
+            <a:extLst>
+              <a:ext uri="{FF2B5EF4-FFF2-40B4-BE49-F238E27FC236}">
+                <a16:creationId xmlns:a16="http://schemas.microsoft.com/office/drawing/2014/main" id="{82BCEA5C-0A30-4350-BC69-B5AD92F203B4}"/>
+              </a:ext>
+            </a:extLst>
+          </p:cNvPr>
+          <p:cNvCxnSpPr>
+            <a:cxnSpLocks/>
+          </p:cNvCxnSpPr>
+          <p:nvPr/>
+        </p:nvCxnSpPr>
+        <p:spPr>
+          <a:xfrm rot="5400000" flipH="1" flipV="1">
+            <a:off x="3171824" y="1558926"/>
+            <a:ext cx="584201" cy="273051"/>
+          </a:xfrm>
+          <a:prstGeom prst="bentConnector3">
+            <a:avLst>
+              <a:gd name="adj1" fmla="val 50000"/>
+            </a:avLst>
+          </a:prstGeom>
+          <a:ln>
+            <a:tailEnd type="triangle"/>
+          </a:ln>
+        </p:spPr>
+        <p:style>
+          <a:lnRef idx="1">
+            <a:schemeClr val="accent3"/>
+          </a:lnRef>
+          <a:fillRef idx="0">
+            <a:schemeClr val="accent3"/>
+          </a:fillRef>
+          <a:effectRef idx="0">
+            <a:schemeClr val="accent3"/>
+          </a:effectRef>
+          <a:fontRef idx="minor">
+            <a:schemeClr val="tx1"/>
+          </a:fontRef>
+        </p:style>
+      </p:cxnSp>
+      <p:cxnSp>
+        <p:nvCxnSpPr>
+          <p:cNvPr id="109" name="Conexão: Ângulo Reto 108">
+            <a:extLst>
+              <a:ext uri="{FF2B5EF4-FFF2-40B4-BE49-F238E27FC236}">
+                <a16:creationId xmlns:a16="http://schemas.microsoft.com/office/drawing/2014/main" id="{D2C41D38-144E-40F3-9D9B-1B7748E1C52A}"/>
+              </a:ext>
+            </a:extLst>
+          </p:cNvPr>
+          <p:cNvCxnSpPr>
+            <a:cxnSpLocks/>
+          </p:cNvCxnSpPr>
+          <p:nvPr/>
+        </p:nvCxnSpPr>
+        <p:spPr>
+          <a:xfrm rot="5400000">
+            <a:off x="-336550" y="2927350"/>
+            <a:ext cx="2971800" cy="152400"/>
+          </a:xfrm>
+          <a:prstGeom prst="bentConnector3">
+            <a:avLst>
+              <a:gd name="adj1" fmla="val 57692"/>
+            </a:avLst>
+          </a:prstGeom>
+          <a:ln>
+            <a:tailEnd type="triangle"/>
+          </a:ln>
+        </p:spPr>
+        <p:style>
+          <a:lnRef idx="1">
+            <a:schemeClr val="accent3"/>
+          </a:lnRef>
+          <a:fillRef idx="0">
+            <a:schemeClr val="accent3"/>
+          </a:fillRef>
+          <a:effectRef idx="0">
+            <a:schemeClr val="accent3"/>
+          </a:effectRef>
+          <a:fontRef idx="minor">
+            <a:schemeClr val="tx1"/>
+          </a:fontRef>
+        </p:style>
+      </p:cxnSp>
+      <p:cxnSp>
+        <p:nvCxnSpPr>
+          <p:cNvPr id="152" name="Conexão: Ângulo Reto 151">
+            <a:extLst>
+              <a:ext uri="{FF2B5EF4-FFF2-40B4-BE49-F238E27FC236}">
+                <a16:creationId xmlns:a16="http://schemas.microsoft.com/office/drawing/2014/main" id="{90F0F68E-B525-4EDA-BC9D-3AE4B096B8C2}"/>
+              </a:ext>
+            </a:extLst>
+          </p:cNvPr>
+          <p:cNvCxnSpPr>
+            <a:stCxn id="8" idx="0"/>
+            <a:endCxn id="81" idx="0"/>
+          </p:cNvCxnSpPr>
+          <p:nvPr/>
+        </p:nvCxnSpPr>
+        <p:spPr>
+          <a:xfrm rot="5400000" flipH="1" flipV="1">
+            <a:off x="260635" y="1584240"/>
+            <a:ext cx="3504750" cy="2330330"/>
+          </a:xfrm>
+          <a:prstGeom prst="bentConnector3">
+            <a:avLst>
+              <a:gd name="adj1" fmla="val 106523"/>
+            </a:avLst>
+          </a:prstGeom>
+          <a:ln>
+            <a:tailEnd type="triangle"/>
+          </a:ln>
+        </p:spPr>
+        <p:style>
+          <a:lnRef idx="1">
+            <a:schemeClr val="accent3"/>
+          </a:lnRef>
+          <a:fillRef idx="0">
+            <a:schemeClr val="accent3"/>
+          </a:fillRef>
+          <a:effectRef idx="0">
+            <a:schemeClr val="accent3"/>
+          </a:effectRef>
+          <a:fontRef idx="minor">
+            <a:schemeClr val="tx1"/>
+          </a:fontRef>
+        </p:style>
+      </p:cxnSp>
+      <p:cxnSp>
+        <p:nvCxnSpPr>
+          <p:cNvPr id="154" name="Conexão: Ângulo Reto 153">
+            <a:extLst>
+              <a:ext uri="{FF2B5EF4-FFF2-40B4-BE49-F238E27FC236}">
+                <a16:creationId xmlns:a16="http://schemas.microsoft.com/office/drawing/2014/main" id="{8688E985-A136-4A40-B2DD-E3F90C88A23D}"/>
+              </a:ext>
+            </a:extLst>
+          </p:cNvPr>
+          <p:cNvCxnSpPr/>
+          <p:nvPr/>
+        </p:nvCxnSpPr>
+        <p:spPr>
+          <a:xfrm rot="5400000">
+            <a:off x="260350" y="1428750"/>
+            <a:ext cx="3479800" cy="2628900"/>
+          </a:xfrm>
+          <a:prstGeom prst="bentConnector3">
+            <a:avLst>
+              <a:gd name="adj1" fmla="val -9307"/>
+            </a:avLst>
+          </a:prstGeom>
+          <a:ln>
+            <a:tailEnd type="triangle"/>
+          </a:ln>
+        </p:spPr>
+        <p:style>
+          <a:lnRef idx="1">
+            <a:schemeClr val="accent3"/>
+          </a:lnRef>
+          <a:fillRef idx="0">
+            <a:schemeClr val="accent3"/>
+          </a:fillRef>
+          <a:effectRef idx="0">
+            <a:schemeClr val="accent3"/>
+          </a:effectRef>
+          <a:fontRef idx="minor">
+            <a:schemeClr val="tx1"/>
+          </a:fontRef>
+        </p:style>
+      </p:cxnSp>
+      <p:sp>
+        <p:nvSpPr>
+          <p:cNvPr id="204" name="CaixaDeTexto 203">
+            <a:extLst>
+              <a:ext uri="{FF2B5EF4-FFF2-40B4-BE49-F238E27FC236}">
+                <a16:creationId xmlns:a16="http://schemas.microsoft.com/office/drawing/2014/main" id="{2098438E-5711-448F-885E-57C9919419BB}"/>
               </a:ext>
             </a:extLst>
           </p:cNvPr>
@@ -4942,8 +6524,43 @@
         </p:nvSpPr>
         <p:spPr>
           <a:xfrm>
-            <a:off x="1253550" y="428085"/>
-            <a:ext cx="710451" cy="215444"/>
+            <a:off x="1517651" y="531860"/>
+            <a:ext cx="1746250" cy="184666"/>
+          </a:xfrm>
+          <a:prstGeom prst="rect">
+            <a:avLst/>
+          </a:prstGeom>
+          <a:noFill/>
+        </p:spPr>
+        <p:txBody>
+          <a:bodyPr wrap="square" rtlCol="0">
+            <a:spAutoFit/>
+          </a:bodyPr>
+          <a:lstStyle/>
+          <a:p>
+            <a:r>
+              <a:rPr lang="pt-PT" sz="600" dirty="0"/>
+              <a:t>ImportaExportaInfoDocentes &amp;&amp; Fase1 aberta</a:t>
+            </a:r>
+          </a:p>
+        </p:txBody>
+      </p:sp>
+      <p:sp>
+        <p:nvSpPr>
+          <p:cNvPr id="205" name="CaixaDeTexto 204">
+            <a:extLst>
+              <a:ext uri="{FF2B5EF4-FFF2-40B4-BE49-F238E27FC236}">
+                <a16:creationId xmlns:a16="http://schemas.microsoft.com/office/drawing/2014/main" id="{18AB0E79-B9B5-4531-B0B1-B0F3D9799E10}"/>
+              </a:ext>
+            </a:extLst>
+          </p:cNvPr>
+          <p:cNvSpPr txBox="1"/>
+          <p:nvPr/>
+        </p:nvSpPr>
+        <p:spPr>
+          <a:xfrm>
+            <a:off x="3461258" y="664957"/>
+            <a:ext cx="389851" cy="184666"/>
           </a:xfrm>
           <a:prstGeom prst="rect">
             <a:avLst/>
@@ -4956,20 +6573,73 @@
           </a:bodyPr>
           <a:lstStyle/>
           <a:p>
-            <a:r>
-              <a:rPr lang="pt-PT" sz="800" dirty="0" err="1"/>
-              <a:t>mostraListas</a:t>
-            </a:r>
-            <a:endParaRPr lang="pt-PT" sz="800" dirty="0"/>
-          </a:p>
-        </p:txBody>
-      </p:sp>
-      <p:sp>
-        <p:nvSpPr>
-          <p:cNvPr id="172" name="CaixaDeTexto 171">
-            <a:extLst>
-              <a:ext uri="{FF2B5EF4-FFF2-40B4-BE49-F238E27FC236}">
-                <a16:creationId xmlns:a16="http://schemas.microsoft.com/office/drawing/2014/main" id="{1D3BB3C2-8DFF-4F68-BC5D-142F97A3E25F}"/>
+            <a:pPr algn="r"/>
+            <a:r>
+              <a:rPr lang="pt-PT" sz="600" dirty="0"/>
+              <a:t>edicao</a:t>
+            </a:r>
+          </a:p>
+        </p:txBody>
+      </p:sp>
+      <p:sp>
+        <p:nvSpPr>
+          <p:cNvPr id="225" name="Seta: Curvada Para Cima 224">
+            <a:extLst>
+              <a:ext uri="{FF2B5EF4-FFF2-40B4-BE49-F238E27FC236}">
+                <a16:creationId xmlns:a16="http://schemas.microsoft.com/office/drawing/2014/main" id="{6320B3D8-7B9B-41B4-B857-630E87294B97}"/>
+              </a:ext>
+            </a:extLst>
+          </p:cNvPr>
+          <p:cNvSpPr/>
+          <p:nvPr/>
+        </p:nvSpPr>
+        <p:spPr>
+          <a:xfrm rot="13857238">
+            <a:off x="1998265" y="1019593"/>
+            <a:ext cx="333471" cy="293463"/>
+          </a:xfrm>
+          <a:prstGeom prst="curvedUpArrow">
+            <a:avLst>
+              <a:gd name="adj1" fmla="val 5816"/>
+              <a:gd name="adj2" fmla="val 27233"/>
+              <a:gd name="adj3" fmla="val 17697"/>
+            </a:avLst>
+          </a:prstGeom>
+          <a:ln/>
+        </p:spPr>
+        <p:style>
+          <a:lnRef idx="1">
+            <a:schemeClr val="accent3"/>
+          </a:lnRef>
+          <a:fillRef idx="2">
+            <a:schemeClr val="accent3"/>
+          </a:fillRef>
+          <a:effectRef idx="1">
+            <a:schemeClr val="accent3"/>
+          </a:effectRef>
+          <a:fontRef idx="minor">
+            <a:schemeClr val="dk1"/>
+          </a:fontRef>
+        </p:style>
+        <p:txBody>
+          <a:bodyPr rtlCol="0" anchor="ctr"/>
+          <a:lstStyle/>
+          <a:p>
+            <a:pPr algn="ctr"/>
+            <a:endParaRPr lang="pt-PT" dirty="0">
+              <a:solidFill>
+                <a:schemeClr val="tx1"/>
+              </a:solidFill>
+            </a:endParaRPr>
+          </a:p>
+        </p:txBody>
+      </p:sp>
+      <p:sp>
+        <p:nvSpPr>
+          <p:cNvPr id="226" name="CaixaDeTexto 225">
+            <a:extLst>
+              <a:ext uri="{FF2B5EF4-FFF2-40B4-BE49-F238E27FC236}">
+                <a16:creationId xmlns:a16="http://schemas.microsoft.com/office/drawing/2014/main" id="{4923A5A7-DE67-4550-8DD6-496E33545860}"/>
               </a:ext>
             </a:extLst>
           </p:cNvPr>
@@ -4978,8 +6648,8 @@
         </p:nvSpPr>
         <p:spPr>
           <a:xfrm>
-            <a:off x="2287867" y="425079"/>
-            <a:ext cx="1285929" cy="215444"/>
+            <a:off x="2089658" y="918957"/>
+            <a:ext cx="389851" cy="184666"/>
           </a:xfrm>
           <a:prstGeom prst="rect">
             <a:avLst/>
@@ -4992,23 +6662,73 @@
           </a:bodyPr>
           <a:lstStyle/>
           <a:p>
-            <a:r>
-              <a:rPr lang="pt-PT" sz="800" dirty="0" err="1"/>
-              <a:t>editaInfo</a:t>
-            </a:r>
-            <a:r>
-              <a:rPr lang="pt-PT" sz="800" dirty="0"/>
-              <a:t> &amp;&amp; Fase1 aberta</a:t>
-            </a:r>
-          </a:p>
-        </p:txBody>
-      </p:sp>
-      <p:sp>
-        <p:nvSpPr>
-          <p:cNvPr id="173" name="CaixaDeTexto 172">
-            <a:extLst>
-              <a:ext uri="{FF2B5EF4-FFF2-40B4-BE49-F238E27FC236}">
-                <a16:creationId xmlns:a16="http://schemas.microsoft.com/office/drawing/2014/main" id="{EB10D471-3C45-4C98-83EE-87ED13EDE7A4}"/>
+            <a:pPr algn="r"/>
+            <a:r>
+              <a:rPr lang="pt-PT" sz="600" dirty="0"/>
+              <a:t>edicao</a:t>
+            </a:r>
+          </a:p>
+        </p:txBody>
+      </p:sp>
+      <p:sp>
+        <p:nvSpPr>
+          <p:cNvPr id="227" name="Seta: Curvada Para Cima 226">
+            <a:extLst>
+              <a:ext uri="{FF2B5EF4-FFF2-40B4-BE49-F238E27FC236}">
+                <a16:creationId xmlns:a16="http://schemas.microsoft.com/office/drawing/2014/main" id="{C2F96197-F941-4AE9-BADF-DB4C3280767B}"/>
+              </a:ext>
+            </a:extLst>
+          </p:cNvPr>
+          <p:cNvSpPr/>
+          <p:nvPr/>
+        </p:nvSpPr>
+        <p:spPr>
+          <a:xfrm rot="9383946">
+            <a:off x="5224521" y="1335428"/>
+            <a:ext cx="326939" cy="293463"/>
+          </a:xfrm>
+          <a:prstGeom prst="curvedUpArrow">
+            <a:avLst>
+              <a:gd name="adj1" fmla="val 5816"/>
+              <a:gd name="adj2" fmla="val 27233"/>
+              <a:gd name="adj3" fmla="val 17697"/>
+            </a:avLst>
+          </a:prstGeom>
+          <a:ln/>
+        </p:spPr>
+        <p:style>
+          <a:lnRef idx="1">
+            <a:schemeClr val="accent3"/>
+          </a:lnRef>
+          <a:fillRef idx="2">
+            <a:schemeClr val="accent3"/>
+          </a:fillRef>
+          <a:effectRef idx="1">
+            <a:schemeClr val="accent3"/>
+          </a:effectRef>
+          <a:fontRef idx="minor">
+            <a:schemeClr val="dk1"/>
+          </a:fontRef>
+        </p:style>
+        <p:txBody>
+          <a:bodyPr rtlCol="0" anchor="ctr"/>
+          <a:lstStyle/>
+          <a:p>
+            <a:pPr algn="ctr"/>
+            <a:endParaRPr lang="pt-PT" dirty="0">
+              <a:solidFill>
+                <a:schemeClr val="tx1"/>
+              </a:solidFill>
+            </a:endParaRPr>
+          </a:p>
+        </p:txBody>
+      </p:sp>
+      <p:sp>
+        <p:nvSpPr>
+          <p:cNvPr id="228" name="CaixaDeTexto 227">
+            <a:extLst>
+              <a:ext uri="{FF2B5EF4-FFF2-40B4-BE49-F238E27FC236}">
+                <a16:creationId xmlns:a16="http://schemas.microsoft.com/office/drawing/2014/main" id="{184E4310-B320-4AD4-BE84-78A211B09A5D}"/>
               </a:ext>
             </a:extLst>
           </p:cNvPr>
@@ -5017,8 +6737,8 @@
         </p:nvSpPr>
         <p:spPr>
           <a:xfrm>
-            <a:off x="151694" y="966988"/>
-            <a:ext cx="1249060" cy="184666"/>
+            <a:off x="5131308" y="1166607"/>
+            <a:ext cx="389851" cy="184666"/>
           </a:xfrm>
           <a:prstGeom prst="rect">
             <a:avLst/>
@@ -5031,19 +6751,20 @@
           </a:bodyPr>
           <a:lstStyle/>
           <a:p>
+            <a:pPr algn="r"/>
             <a:r>
               <a:rPr lang="pt-PT" sz="600" dirty="0"/>
-              <a:t>Importa/Exporta &amp;&amp; Fase1 aberta</a:t>
-            </a:r>
-          </a:p>
-        </p:txBody>
-      </p:sp>
-      <p:sp>
-        <p:nvSpPr>
-          <p:cNvPr id="177" name="CaixaDeTexto 176">
-            <a:extLst>
-              <a:ext uri="{FF2B5EF4-FFF2-40B4-BE49-F238E27FC236}">
-                <a16:creationId xmlns:a16="http://schemas.microsoft.com/office/drawing/2014/main" id="{4FC9D7F5-65EA-463F-B346-8A3A74C70306}"/>
+              <a:t>edicao</a:t>
+            </a:r>
+          </a:p>
+        </p:txBody>
+      </p:sp>
+      <p:sp>
+        <p:nvSpPr>
+          <p:cNvPr id="229" name="CaixaDeTexto 228">
+            <a:extLst>
+              <a:ext uri="{FF2B5EF4-FFF2-40B4-BE49-F238E27FC236}">
+                <a16:creationId xmlns:a16="http://schemas.microsoft.com/office/drawing/2014/main" id="{ECA085D0-55E6-4F82-A308-1AE737741A4F}"/>
               </a:ext>
             </a:extLst>
           </p:cNvPr>
@@ -5052,8 +6773,85 @@
         </p:nvSpPr>
         <p:spPr>
           <a:xfrm>
-            <a:off x="814551" y="1493901"/>
-            <a:ext cx="1023037" cy="415498"/>
+            <a:off x="2020888" y="234997"/>
+            <a:ext cx="1746250" cy="184666"/>
+          </a:xfrm>
+          <a:prstGeom prst="rect">
+            <a:avLst/>
+          </a:prstGeom>
+          <a:noFill/>
+        </p:spPr>
+        <p:txBody>
+          <a:bodyPr wrap="square" rtlCol="0">
+            <a:spAutoFit/>
+          </a:bodyPr>
+          <a:lstStyle/>
+          <a:p>
+            <a:r>
+              <a:rPr lang="pt-PT" sz="600" dirty="0"/>
+              <a:t>ImportaExportaInfoPropostas &amp;&amp; Fase1 aberta</a:t>
+            </a:r>
+          </a:p>
+        </p:txBody>
+      </p:sp>
+      <p:cxnSp>
+        <p:nvCxnSpPr>
+          <p:cNvPr id="237" name="Conexão: Ângulo Reto 236">
+            <a:extLst>
+              <a:ext uri="{FF2B5EF4-FFF2-40B4-BE49-F238E27FC236}">
+                <a16:creationId xmlns:a16="http://schemas.microsoft.com/office/drawing/2014/main" id="{EB8241C2-427B-4E34-BCCA-8F6417377DB9}"/>
+              </a:ext>
+            </a:extLst>
+          </p:cNvPr>
+          <p:cNvCxnSpPr>
+            <a:stCxn id="82" idx="2"/>
+            <a:endCxn id="4" idx="3"/>
+          </p:cNvCxnSpPr>
+          <p:nvPr/>
+        </p:nvCxnSpPr>
+        <p:spPr>
+          <a:xfrm rot="5400000">
+            <a:off x="4575745" y="880341"/>
+            <a:ext cx="204570" cy="2451764"/>
+          </a:xfrm>
+          <a:prstGeom prst="bentConnector2">
+            <a:avLst/>
+          </a:prstGeom>
+          <a:ln>
+            <a:tailEnd type="triangle"/>
+          </a:ln>
+        </p:spPr>
+        <p:style>
+          <a:lnRef idx="1">
+            <a:schemeClr val="accent3"/>
+          </a:lnRef>
+          <a:fillRef idx="0">
+            <a:schemeClr val="accent3"/>
+          </a:fillRef>
+          <a:effectRef idx="0">
+            <a:schemeClr val="accent3"/>
+          </a:effectRef>
+          <a:fontRef idx="minor">
+            <a:schemeClr val="tx1"/>
+          </a:fontRef>
+        </p:style>
+      </p:cxnSp>
+      <p:sp>
+        <p:nvSpPr>
+          <p:cNvPr id="241" name="CaixaDeTexto 240">
+            <a:extLst>
+              <a:ext uri="{FF2B5EF4-FFF2-40B4-BE49-F238E27FC236}">
+                <a16:creationId xmlns:a16="http://schemas.microsoft.com/office/drawing/2014/main" id="{DA4F726E-9A1F-409F-861D-CB6012916527}"/>
+              </a:ext>
+            </a:extLst>
+          </p:cNvPr>
+          <p:cNvSpPr txBox="1"/>
+          <p:nvPr/>
+        </p:nvSpPr>
+        <p:spPr>
+          <a:xfrm>
+            <a:off x="4380697" y="2036557"/>
+            <a:ext cx="689612" cy="184666"/>
           </a:xfrm>
           <a:prstGeom prst="rect">
             <a:avLst/>
@@ -5068,42 +6866,18 @@
           <a:p>
             <a:pPr algn="r"/>
             <a:r>
-              <a:rPr lang="pt-PT" sz="700" dirty="0" err="1"/>
-              <a:t>classificaAlunos</a:t>
-            </a:r>
-            <a:endParaRPr lang="pt-PT" sz="700" dirty="0"/>
-          </a:p>
-          <a:p>
-            <a:pPr algn="r"/>
-            <a:r>
-              <a:rPr lang="pt-PT" sz="700" dirty="0"/>
-              <a:t>Fase1 fechada</a:t>
-            </a:r>
-          </a:p>
-          <a:p>
-            <a:pPr algn="r"/>
-            <a:r>
-              <a:rPr lang="pt-PT" sz="700" dirty="0" err="1"/>
-              <a:t>nAlunos</a:t>
-            </a:r>
-            <a:r>
-              <a:rPr lang="pt-PT" sz="700" dirty="0"/>
-              <a:t> &lt;= </a:t>
-            </a:r>
-            <a:r>
-              <a:rPr lang="pt-PT" sz="700" dirty="0" err="1"/>
-              <a:t>nPropostas</a:t>
-            </a:r>
-            <a:endParaRPr lang="pt-PT" sz="700" dirty="0"/>
-          </a:p>
-        </p:txBody>
-      </p:sp>
-      <p:sp>
-        <p:nvSpPr>
-          <p:cNvPr id="180" name="CaixaDeTexto 179">
-            <a:extLst>
-              <a:ext uri="{FF2B5EF4-FFF2-40B4-BE49-F238E27FC236}">
-                <a16:creationId xmlns:a16="http://schemas.microsoft.com/office/drawing/2014/main" id="{66FA3C52-5F51-42F6-8058-911ED8AD1204}"/>
+              <a:rPr lang="pt-PT" sz="600" dirty="0"/>
+              <a:t>gravaAlteracoes</a:t>
+            </a:r>
+          </a:p>
+        </p:txBody>
+      </p:sp>
+      <p:sp>
+        <p:nvSpPr>
+          <p:cNvPr id="252" name="CaixaDeTexto 251">
+            <a:extLst>
+              <a:ext uri="{FF2B5EF4-FFF2-40B4-BE49-F238E27FC236}">
+                <a16:creationId xmlns:a16="http://schemas.microsoft.com/office/drawing/2014/main" id="{4BAAA763-0CC3-4858-A238-5602493F806A}"/>
               </a:ext>
             </a:extLst>
           </p:cNvPr>
@@ -5112,8 +6886,8 @@
         </p:nvSpPr>
         <p:spPr>
           <a:xfrm>
-            <a:off x="2229066" y="1638163"/>
-            <a:ext cx="673582" cy="276999"/>
+            <a:off x="2374097" y="1693657"/>
+            <a:ext cx="689612" cy="184666"/>
           </a:xfrm>
           <a:prstGeom prst="rect">
             <a:avLst/>
@@ -5126,26 +6900,155 @@
           </a:bodyPr>
           <a:lstStyle/>
           <a:p>
-            <a:r>
-              <a:rPr lang="pt-PT" sz="600" dirty="0" err="1"/>
-              <a:t>classificaAlunos</a:t>
-            </a:r>
-            <a:endParaRPr lang="pt-PT" sz="600" dirty="0"/>
-          </a:p>
-          <a:p>
+            <a:pPr algn="r"/>
             <a:r>
               <a:rPr lang="pt-PT" sz="600" dirty="0"/>
-              <a:t>Fase1 aberta</a:t>
-            </a:r>
-          </a:p>
-        </p:txBody>
-      </p:sp>
-      <p:sp>
-        <p:nvSpPr>
-          <p:cNvPr id="181" name="CaixaDeTexto 180">
-            <a:extLst>
-              <a:ext uri="{FF2B5EF4-FFF2-40B4-BE49-F238E27FC236}">
-                <a16:creationId xmlns:a16="http://schemas.microsoft.com/office/drawing/2014/main" id="{48B68971-5E7F-4E6F-AECC-9DE754020B0C}"/>
+              <a:t>gravaAlteracoes</a:t>
+            </a:r>
+          </a:p>
+        </p:txBody>
+      </p:sp>
+      <p:cxnSp>
+        <p:nvCxnSpPr>
+          <p:cNvPr id="267" name="Conexão: Ângulo Reto 266">
+            <a:extLst>
+              <a:ext uri="{FF2B5EF4-FFF2-40B4-BE49-F238E27FC236}">
+                <a16:creationId xmlns:a16="http://schemas.microsoft.com/office/drawing/2014/main" id="{04756CE6-2AC3-4074-925E-3BC3770682B4}"/>
+              </a:ext>
+            </a:extLst>
+          </p:cNvPr>
+          <p:cNvCxnSpPr/>
+          <p:nvPr/>
+        </p:nvCxnSpPr>
+        <p:spPr>
+          <a:xfrm rot="10800000">
+            <a:off x="1327150" y="1581150"/>
+            <a:ext cx="1130300" cy="838200"/>
+          </a:xfrm>
+          <a:prstGeom prst="bentConnector3">
+            <a:avLst>
+              <a:gd name="adj1" fmla="val 100562"/>
+            </a:avLst>
+          </a:prstGeom>
+          <a:ln>
+            <a:tailEnd type="triangle"/>
+          </a:ln>
+        </p:spPr>
+        <p:style>
+          <a:lnRef idx="1">
+            <a:schemeClr val="accent3"/>
+          </a:lnRef>
+          <a:fillRef idx="0">
+            <a:schemeClr val="accent3"/>
+          </a:fillRef>
+          <a:effectRef idx="0">
+            <a:schemeClr val="accent3"/>
+          </a:effectRef>
+          <a:fontRef idx="minor">
+            <a:schemeClr val="tx1"/>
+          </a:fontRef>
+        </p:style>
+      </p:cxnSp>
+      <p:cxnSp>
+        <p:nvCxnSpPr>
+          <p:cNvPr id="275" name="Conexão: Ângulo Reto 274">
+            <a:extLst>
+              <a:ext uri="{FF2B5EF4-FFF2-40B4-BE49-F238E27FC236}">
+                <a16:creationId xmlns:a16="http://schemas.microsoft.com/office/drawing/2014/main" id="{7B7CB362-31CB-4968-9A87-AFE4E232E5AB}"/>
+              </a:ext>
+            </a:extLst>
+          </p:cNvPr>
+          <p:cNvCxnSpPr>
+            <a:cxnSpLocks/>
+          </p:cNvCxnSpPr>
+          <p:nvPr/>
+        </p:nvCxnSpPr>
+        <p:spPr>
+          <a:xfrm rot="5400000">
+            <a:off x="2311400" y="1555750"/>
+            <a:ext cx="590550" cy="298450"/>
+          </a:xfrm>
+          <a:prstGeom prst="bentConnector3">
+            <a:avLst/>
+          </a:prstGeom>
+          <a:ln>
+            <a:tailEnd type="triangle"/>
+          </a:ln>
+        </p:spPr>
+        <p:style>
+          <a:lnRef idx="1">
+            <a:schemeClr val="accent3"/>
+          </a:lnRef>
+          <a:fillRef idx="0">
+            <a:schemeClr val="accent3"/>
+          </a:fillRef>
+          <a:effectRef idx="0">
+            <a:schemeClr val="accent3"/>
+          </a:effectRef>
+          <a:fontRef idx="minor">
+            <a:schemeClr val="tx1"/>
+          </a:fontRef>
+        </p:style>
+      </p:cxnSp>
+      <p:sp>
+        <p:nvSpPr>
+          <p:cNvPr id="277" name="Seta: Curvada Para Cima 276">
+            <a:extLst>
+              <a:ext uri="{FF2B5EF4-FFF2-40B4-BE49-F238E27FC236}">
+                <a16:creationId xmlns:a16="http://schemas.microsoft.com/office/drawing/2014/main" id="{D14DDC7F-101C-485E-A5C4-699DF4FA854D}"/>
+              </a:ext>
+            </a:extLst>
+          </p:cNvPr>
+          <p:cNvSpPr/>
+          <p:nvPr/>
+        </p:nvSpPr>
+        <p:spPr>
+          <a:xfrm rot="15872578">
+            <a:off x="3736389" y="1092663"/>
+            <a:ext cx="225123" cy="293463"/>
+          </a:xfrm>
+          <a:prstGeom prst="curvedUpArrow">
+            <a:avLst>
+              <a:gd name="adj1" fmla="val 5816"/>
+              <a:gd name="adj2" fmla="val 27233"/>
+              <a:gd name="adj3" fmla="val 17697"/>
+            </a:avLst>
+          </a:prstGeom>
+          <a:ln/>
+        </p:spPr>
+        <p:style>
+          <a:lnRef idx="1">
+            <a:schemeClr val="accent3"/>
+          </a:lnRef>
+          <a:fillRef idx="2">
+            <a:schemeClr val="accent3"/>
+          </a:fillRef>
+          <a:effectRef idx="1">
+            <a:schemeClr val="accent3"/>
+          </a:effectRef>
+          <a:fontRef idx="minor">
+            <a:schemeClr val="dk1"/>
+          </a:fontRef>
+        </p:style>
+        <p:txBody>
+          <a:bodyPr rtlCol="0" anchor="ctr"/>
+          <a:lstStyle/>
+          <a:p>
+            <a:pPr algn="ctr"/>
+            <a:endParaRPr lang="pt-PT" dirty="0">
+              <a:solidFill>
+                <a:schemeClr val="tx1"/>
+              </a:solidFill>
+            </a:endParaRPr>
+          </a:p>
+        </p:txBody>
+      </p:sp>
+      <p:sp>
+        <p:nvSpPr>
+          <p:cNvPr id="278" name="CaixaDeTexto 277">
+            <a:extLst>
+              <a:ext uri="{FF2B5EF4-FFF2-40B4-BE49-F238E27FC236}">
+                <a16:creationId xmlns:a16="http://schemas.microsoft.com/office/drawing/2014/main" id="{B31597B2-9AD5-4B1F-AF20-EFD1EC74B908}"/>
               </a:ext>
             </a:extLst>
           </p:cNvPr>
@@ -5154,8 +7057,8 @@
         </p:nvSpPr>
         <p:spPr>
           <a:xfrm>
-            <a:off x="3685339" y="1059321"/>
-            <a:ext cx="587020" cy="276999"/>
+            <a:off x="3938617" y="1076902"/>
+            <a:ext cx="710451" cy="215444"/>
           </a:xfrm>
           <a:prstGeom prst="rect">
             <a:avLst/>
@@ -5169,25 +7072,71 @@
           <a:lstStyle/>
           <a:p>
             <a:r>
-              <a:rPr lang="pt-PT" sz="600" dirty="0" err="1"/>
-              <a:t>return</a:t>
-            </a:r>
-            <a:endParaRPr lang="pt-PT" sz="600" dirty="0"/>
-          </a:p>
-          <a:p>
-            <a:r>
-              <a:rPr lang="pt-PT" sz="600" dirty="0"/>
-              <a:t>Fase2 aberta</a:t>
-            </a:r>
-          </a:p>
-        </p:txBody>
-      </p:sp>
-      <p:sp>
-        <p:nvSpPr>
-          <p:cNvPr id="182" name="CaixaDeTexto 181">
-            <a:extLst>
-              <a:ext uri="{FF2B5EF4-FFF2-40B4-BE49-F238E27FC236}">
-                <a16:creationId xmlns:a16="http://schemas.microsoft.com/office/drawing/2014/main" id="{48C2AF2D-B958-460E-B07D-59B8498DE3EF}"/>
+              <a:rPr lang="pt-PT" sz="800" dirty="0"/>
+              <a:t>mostraListas</a:t>
+            </a:r>
+          </a:p>
+        </p:txBody>
+      </p:sp>
+      <p:sp>
+        <p:nvSpPr>
+          <p:cNvPr id="279" name="Seta: Curvada Para Cima 278">
+            <a:extLst>
+              <a:ext uri="{FF2B5EF4-FFF2-40B4-BE49-F238E27FC236}">
+                <a16:creationId xmlns:a16="http://schemas.microsoft.com/office/drawing/2014/main" id="{C568FBEF-BB0F-4E53-80CE-FA9D18B4580A}"/>
+              </a:ext>
+            </a:extLst>
+          </p:cNvPr>
+          <p:cNvSpPr/>
+          <p:nvPr/>
+        </p:nvSpPr>
+        <p:spPr>
+          <a:xfrm rot="11709369">
+            <a:off x="6327190" y="1365712"/>
+            <a:ext cx="225123" cy="293463"/>
+          </a:xfrm>
+          <a:prstGeom prst="curvedUpArrow">
+            <a:avLst>
+              <a:gd name="adj1" fmla="val 5816"/>
+              <a:gd name="adj2" fmla="val 27233"/>
+              <a:gd name="adj3" fmla="val 17697"/>
+            </a:avLst>
+          </a:prstGeom>
+          <a:ln/>
+        </p:spPr>
+        <p:style>
+          <a:lnRef idx="1">
+            <a:schemeClr val="accent3"/>
+          </a:lnRef>
+          <a:fillRef idx="2">
+            <a:schemeClr val="accent3"/>
+          </a:fillRef>
+          <a:effectRef idx="1">
+            <a:schemeClr val="accent3"/>
+          </a:effectRef>
+          <a:fontRef idx="minor">
+            <a:schemeClr val="dk1"/>
+          </a:fontRef>
+        </p:style>
+        <p:txBody>
+          <a:bodyPr rtlCol="0" anchor="ctr"/>
+          <a:lstStyle/>
+          <a:p>
+            <a:pPr algn="ctr"/>
+            <a:endParaRPr lang="pt-PT" dirty="0">
+              <a:solidFill>
+                <a:schemeClr val="tx1"/>
+              </a:solidFill>
+            </a:endParaRPr>
+          </a:p>
+        </p:txBody>
+      </p:sp>
+      <p:sp>
+        <p:nvSpPr>
+          <p:cNvPr id="280" name="CaixaDeTexto 279">
+            <a:extLst>
+              <a:ext uri="{FF2B5EF4-FFF2-40B4-BE49-F238E27FC236}">
+                <a16:creationId xmlns:a16="http://schemas.microsoft.com/office/drawing/2014/main" id="{0444BEAD-F8F3-4CD4-BA54-8D91C63DEF0F}"/>
               </a:ext>
             </a:extLst>
           </p:cNvPr>
@@ -5196,8 +7145,8 @@
         </p:nvSpPr>
         <p:spPr>
           <a:xfrm>
-            <a:off x="1027748" y="2500079"/>
-            <a:ext cx="1249060" cy="184666"/>
+            <a:off x="6147549" y="1153102"/>
+            <a:ext cx="710451" cy="215444"/>
           </a:xfrm>
           <a:prstGeom prst="rect">
             <a:avLst/>
@@ -5211,18 +7160,61 @@
           <a:lstStyle/>
           <a:p>
             <a:r>
-              <a:rPr lang="pt-PT" sz="600" dirty="0"/>
-              <a:t>Importa/Exporta &amp;&amp; Fase2 aberta</a:t>
-            </a:r>
-          </a:p>
-        </p:txBody>
-      </p:sp>
-      <p:sp>
-        <p:nvSpPr>
-          <p:cNvPr id="184" name="CaixaDeTexto 183">
-            <a:extLst>
-              <a:ext uri="{FF2B5EF4-FFF2-40B4-BE49-F238E27FC236}">
-                <a16:creationId xmlns:a16="http://schemas.microsoft.com/office/drawing/2014/main" id="{9EC14320-BAEC-4D37-BB01-C344256DE3D2}"/>
+              <a:rPr lang="pt-PT" sz="800" dirty="0"/>
+              <a:t>mostraListas</a:t>
+            </a:r>
+          </a:p>
+        </p:txBody>
+      </p:sp>
+      <p:cxnSp>
+        <p:nvCxnSpPr>
+          <p:cNvPr id="282" name="Conexão: Ângulo Reto 281">
+            <a:extLst>
+              <a:ext uri="{FF2B5EF4-FFF2-40B4-BE49-F238E27FC236}">
+                <a16:creationId xmlns:a16="http://schemas.microsoft.com/office/drawing/2014/main" id="{C53504FF-50F5-4C63-88F6-F6950DA4895E}"/>
+              </a:ext>
+            </a:extLst>
+          </p:cNvPr>
+          <p:cNvCxnSpPr>
+            <a:stCxn id="80" idx="2"/>
+          </p:cNvCxnSpPr>
+          <p:nvPr/>
+        </p:nvCxnSpPr>
+        <p:spPr>
+          <a:xfrm rot="16200000" flipH="1">
+            <a:off x="1616332" y="1667131"/>
+            <a:ext cx="490025" cy="315912"/>
+          </a:xfrm>
+          <a:prstGeom prst="bentConnector3">
+            <a:avLst>
+              <a:gd name="adj1" fmla="val 55184"/>
+            </a:avLst>
+          </a:prstGeom>
+          <a:ln>
+            <a:tailEnd type="triangle"/>
+          </a:ln>
+        </p:spPr>
+        <p:style>
+          <a:lnRef idx="1">
+            <a:schemeClr val="accent3"/>
+          </a:lnRef>
+          <a:fillRef idx="0">
+            <a:schemeClr val="accent3"/>
+          </a:fillRef>
+          <a:effectRef idx="0">
+            <a:schemeClr val="accent3"/>
+          </a:effectRef>
+          <a:fontRef idx="minor">
+            <a:schemeClr val="tx1"/>
+          </a:fontRef>
+        </p:style>
+      </p:cxnSp>
+      <p:sp>
+        <p:nvSpPr>
+          <p:cNvPr id="284" name="CaixaDeTexto 283">
+            <a:extLst>
+              <a:ext uri="{FF2B5EF4-FFF2-40B4-BE49-F238E27FC236}">
+                <a16:creationId xmlns:a16="http://schemas.microsoft.com/office/drawing/2014/main" id="{6B22AAFD-9259-4AE2-8155-B445AD9B3565}"/>
               </a:ext>
             </a:extLst>
           </p:cNvPr>
@@ -5231,8 +7223,8 @@
         </p:nvSpPr>
         <p:spPr>
           <a:xfrm>
-            <a:off x="3894743" y="1987865"/>
-            <a:ext cx="1010213" cy="184666"/>
+            <a:off x="1643847" y="1674607"/>
+            <a:ext cx="689612" cy="184666"/>
           </a:xfrm>
           <a:prstGeom prst="rect">
             <a:avLst/>
@@ -5245,834 +7237,120 @@
           </a:bodyPr>
           <a:lstStyle/>
           <a:p>
-            <a:r>
-              <a:rPr lang="pt-PT" sz="600" dirty="0" err="1"/>
-              <a:t>editaInfo</a:t>
-            </a:r>
+            <a:pPr algn="r"/>
             <a:r>
               <a:rPr lang="pt-PT" sz="600" dirty="0"/>
-              <a:t> &amp;&amp; Fase2 aberta</a:t>
-            </a:r>
-          </a:p>
-        </p:txBody>
-      </p:sp>
-      <p:sp>
-        <p:nvSpPr>
-          <p:cNvPr id="185" name="CaixaDeTexto 184">
-            <a:extLst>
-              <a:ext uri="{FF2B5EF4-FFF2-40B4-BE49-F238E27FC236}">
-                <a16:creationId xmlns:a16="http://schemas.microsoft.com/office/drawing/2014/main" id="{72E04D74-B839-4E9A-88B6-2F6819D21129}"/>
-              </a:ext>
-            </a:extLst>
-          </p:cNvPr>
-          <p:cNvSpPr txBox="1"/>
+              <a:t>gravaAlteracoes</a:t>
+            </a:r>
+          </a:p>
+        </p:txBody>
+      </p:sp>
+      <p:sp>
+        <p:nvSpPr>
+          <p:cNvPr id="285" name="Balão: Seta Para a Esquerda 284">
+            <a:extLst>
+              <a:ext uri="{FF2B5EF4-FFF2-40B4-BE49-F238E27FC236}">
+                <a16:creationId xmlns:a16="http://schemas.microsoft.com/office/drawing/2014/main" id="{1259F054-318A-47E2-99DF-F246A5FAF60B}"/>
+              </a:ext>
+            </a:extLst>
+          </p:cNvPr>
+          <p:cNvSpPr/>
           <p:nvPr/>
         </p:nvSpPr>
         <p:spPr>
           <a:xfrm>
-            <a:off x="2281240" y="3040177"/>
-            <a:ext cx="579005" cy="184666"/>
-          </a:xfrm>
-          <a:prstGeom prst="rect">
-            <a:avLst/>
-          </a:prstGeom>
-          <a:noFill/>
-        </p:spPr>
-        <p:txBody>
-          <a:bodyPr wrap="none" rtlCol="0">
-            <a:spAutoFit/>
-          </a:bodyPr>
-          <a:lstStyle/>
-          <a:p>
-            <a:r>
-              <a:rPr lang="pt-PT" sz="600" dirty="0" err="1"/>
-              <a:t>mostraListas</a:t>
-            </a:r>
-            <a:endParaRPr lang="pt-PT" sz="600" dirty="0"/>
-          </a:p>
-        </p:txBody>
-      </p:sp>
-      <p:sp>
-        <p:nvSpPr>
-          <p:cNvPr id="186" name="CaixaDeTexto 185">
-            <a:extLst>
-              <a:ext uri="{FF2B5EF4-FFF2-40B4-BE49-F238E27FC236}">
-                <a16:creationId xmlns:a16="http://schemas.microsoft.com/office/drawing/2014/main" id="{E2C45B14-7A9E-45EC-9CBF-6607A8D0113A}"/>
-              </a:ext>
-            </a:extLst>
-          </p:cNvPr>
-          <p:cNvSpPr txBox="1"/>
-          <p:nvPr/>
-        </p:nvSpPr>
-        <p:spPr>
-          <a:xfrm>
-            <a:off x="4495172" y="2731743"/>
-            <a:ext cx="184731" cy="184666"/>
-          </a:xfrm>
-          <a:prstGeom prst="rect">
-            <a:avLst/>
-          </a:prstGeom>
-          <a:noFill/>
-        </p:spPr>
-        <p:txBody>
-          <a:bodyPr wrap="none" rtlCol="0">
-            <a:spAutoFit/>
-          </a:bodyPr>
-          <a:lstStyle/>
-          <a:p>
-            <a:endParaRPr lang="pt-PT" sz="600" dirty="0"/>
-          </a:p>
-        </p:txBody>
-      </p:sp>
-      <p:sp>
-        <p:nvSpPr>
-          <p:cNvPr id="187" name="CaixaDeTexto 186">
-            <a:extLst>
-              <a:ext uri="{FF2B5EF4-FFF2-40B4-BE49-F238E27FC236}">
-                <a16:creationId xmlns:a16="http://schemas.microsoft.com/office/drawing/2014/main" id="{713E4EC9-6693-4F2C-BE22-45C6995F380B}"/>
-              </a:ext>
-            </a:extLst>
-          </p:cNvPr>
-          <p:cNvSpPr txBox="1"/>
-          <p:nvPr/>
-        </p:nvSpPr>
-        <p:spPr>
-          <a:xfrm>
-            <a:off x="3158541" y="4208788"/>
-            <a:ext cx="587020" cy="184666"/>
-          </a:xfrm>
-          <a:prstGeom prst="rect">
-            <a:avLst/>
-          </a:prstGeom>
-          <a:noFill/>
-        </p:spPr>
-        <p:txBody>
-          <a:bodyPr wrap="none" rtlCol="0">
-            <a:spAutoFit/>
-          </a:bodyPr>
-          <a:lstStyle/>
-          <a:p>
-            <a:r>
-              <a:rPr lang="pt-PT" sz="600" dirty="0"/>
-              <a:t>Fase2 aberta</a:t>
-            </a:r>
-          </a:p>
-        </p:txBody>
-      </p:sp>
-      <p:sp>
-        <p:nvSpPr>
-          <p:cNvPr id="188" name="CaixaDeTexto 187">
-            <a:extLst>
-              <a:ext uri="{FF2B5EF4-FFF2-40B4-BE49-F238E27FC236}">
-                <a16:creationId xmlns:a16="http://schemas.microsoft.com/office/drawing/2014/main" id="{79E7F383-5BAD-4931-9F94-4BB040DBA39A}"/>
-              </a:ext>
-            </a:extLst>
-          </p:cNvPr>
-          <p:cNvSpPr txBox="1"/>
-          <p:nvPr/>
-        </p:nvSpPr>
-        <p:spPr>
-          <a:xfrm>
-            <a:off x="4334592" y="2889872"/>
-            <a:ext cx="587020" cy="276999"/>
-          </a:xfrm>
-          <a:prstGeom prst="rect">
-            <a:avLst/>
-          </a:prstGeom>
-          <a:noFill/>
-        </p:spPr>
-        <p:txBody>
-          <a:bodyPr wrap="none" rtlCol="0">
-            <a:spAutoFit/>
-          </a:bodyPr>
-          <a:lstStyle/>
-          <a:p>
-            <a:r>
-              <a:rPr lang="pt-PT" sz="600" dirty="0" err="1"/>
-              <a:t>return</a:t>
-            </a:r>
-            <a:endParaRPr lang="pt-PT" sz="600" dirty="0"/>
-          </a:p>
-          <a:p>
-            <a:r>
-              <a:rPr lang="pt-PT" sz="600" dirty="0"/>
-              <a:t>Fase3 aberta</a:t>
-            </a:r>
-          </a:p>
-        </p:txBody>
-      </p:sp>
-      <p:sp>
-        <p:nvSpPr>
-          <p:cNvPr id="190" name="CaixaDeTexto 189">
-            <a:extLst>
-              <a:ext uri="{FF2B5EF4-FFF2-40B4-BE49-F238E27FC236}">
-                <a16:creationId xmlns:a16="http://schemas.microsoft.com/office/drawing/2014/main" id="{58E1377C-3005-43DB-BA47-24EF3E08A2A5}"/>
-              </a:ext>
-            </a:extLst>
-          </p:cNvPr>
-          <p:cNvSpPr txBox="1"/>
-          <p:nvPr/>
-        </p:nvSpPr>
-        <p:spPr>
-          <a:xfrm>
-            <a:off x="3715629" y="3690847"/>
-            <a:ext cx="647934" cy="276999"/>
-          </a:xfrm>
-          <a:prstGeom prst="rect">
-            <a:avLst/>
-          </a:prstGeom>
-          <a:noFill/>
-        </p:spPr>
-        <p:txBody>
-          <a:bodyPr wrap="none" rtlCol="0">
-            <a:spAutoFit/>
-          </a:bodyPr>
-          <a:lstStyle/>
-          <a:p>
-            <a:r>
-              <a:rPr lang="pt-PT" sz="600" dirty="0"/>
-              <a:t>Fase2 fechada </a:t>
-            </a:r>
-          </a:p>
-          <a:p>
-            <a:r>
-              <a:rPr lang="pt-PT" sz="600" dirty="0"/>
-              <a:t>Fase1 fechada</a:t>
-            </a:r>
-          </a:p>
-        </p:txBody>
-      </p:sp>
-      <p:sp>
-        <p:nvSpPr>
-          <p:cNvPr id="192" name="CaixaDeTexto 191">
-            <a:extLst>
-              <a:ext uri="{FF2B5EF4-FFF2-40B4-BE49-F238E27FC236}">
-                <a16:creationId xmlns:a16="http://schemas.microsoft.com/office/drawing/2014/main" id="{5BC4F4BD-46E8-4DD7-947C-FA61A4160DC4}"/>
-              </a:ext>
-            </a:extLst>
-          </p:cNvPr>
-          <p:cNvSpPr txBox="1"/>
-          <p:nvPr/>
-        </p:nvSpPr>
-        <p:spPr>
-          <a:xfrm>
-            <a:off x="2249262" y="4804568"/>
-            <a:ext cx="1010213" cy="184666"/>
-          </a:xfrm>
-          <a:prstGeom prst="rect">
-            <a:avLst/>
-          </a:prstGeom>
-          <a:noFill/>
-        </p:spPr>
-        <p:txBody>
-          <a:bodyPr wrap="none" rtlCol="0">
-            <a:spAutoFit/>
-          </a:bodyPr>
-          <a:lstStyle/>
-          <a:p>
-            <a:r>
-              <a:rPr lang="pt-PT" sz="600" dirty="0" err="1"/>
-              <a:t>editaInfo</a:t>
-            </a:r>
-            <a:r>
-              <a:rPr lang="pt-PT" sz="600" dirty="0"/>
-              <a:t> &amp;&amp; Fase3 aberta</a:t>
-            </a:r>
-          </a:p>
-        </p:txBody>
-      </p:sp>
-      <p:sp>
-        <p:nvSpPr>
-          <p:cNvPr id="193" name="CaixaDeTexto 192">
-            <a:extLst>
-              <a:ext uri="{FF2B5EF4-FFF2-40B4-BE49-F238E27FC236}">
-                <a16:creationId xmlns:a16="http://schemas.microsoft.com/office/drawing/2014/main" id="{E318FC00-A4E0-4C60-840B-F34A97A9FE35}"/>
-              </a:ext>
-            </a:extLst>
-          </p:cNvPr>
-          <p:cNvSpPr txBox="1"/>
-          <p:nvPr/>
-        </p:nvSpPr>
-        <p:spPr>
-          <a:xfrm>
-            <a:off x="2259363" y="5911494"/>
-            <a:ext cx="579005" cy="184666"/>
-          </a:xfrm>
-          <a:prstGeom prst="rect">
-            <a:avLst/>
-          </a:prstGeom>
-          <a:noFill/>
-        </p:spPr>
-        <p:txBody>
-          <a:bodyPr wrap="none" rtlCol="0">
-            <a:spAutoFit/>
-          </a:bodyPr>
-          <a:lstStyle/>
-          <a:p>
-            <a:r>
-              <a:rPr lang="pt-PT" sz="600" dirty="0" err="1"/>
-              <a:t>mostraListas</a:t>
-            </a:r>
-            <a:endParaRPr lang="pt-PT" sz="600" dirty="0"/>
-          </a:p>
-        </p:txBody>
-      </p:sp>
-      <p:sp>
-        <p:nvSpPr>
-          <p:cNvPr id="194" name="CaixaDeTexto 193">
-            <a:extLst>
-              <a:ext uri="{FF2B5EF4-FFF2-40B4-BE49-F238E27FC236}">
-                <a16:creationId xmlns:a16="http://schemas.microsoft.com/office/drawing/2014/main" id="{C2D3E42D-49EA-40CB-BB18-331F9DBF655E}"/>
-              </a:ext>
-            </a:extLst>
-          </p:cNvPr>
-          <p:cNvSpPr txBox="1"/>
-          <p:nvPr/>
-        </p:nvSpPr>
-        <p:spPr>
-          <a:xfrm>
-            <a:off x="4604309" y="5314332"/>
-            <a:ext cx="1192955" cy="184666"/>
-          </a:xfrm>
-          <a:prstGeom prst="rect">
-            <a:avLst/>
-          </a:prstGeom>
-          <a:noFill/>
-        </p:spPr>
-        <p:txBody>
-          <a:bodyPr wrap="none" rtlCol="0">
-            <a:spAutoFit/>
-          </a:bodyPr>
-          <a:lstStyle/>
-          <a:p>
-            <a:r>
-              <a:rPr lang="pt-PT" sz="600" dirty="0" err="1"/>
-              <a:t>atribuicaoAuto</a:t>
-            </a:r>
-            <a:r>
-              <a:rPr lang="pt-PT" sz="600" dirty="0"/>
-              <a:t> &amp;&amp; Fase3 aberta</a:t>
-            </a:r>
-          </a:p>
-        </p:txBody>
-      </p:sp>
-      <p:sp>
-        <p:nvSpPr>
-          <p:cNvPr id="195" name="CaixaDeTexto 194">
-            <a:extLst>
-              <a:ext uri="{FF2B5EF4-FFF2-40B4-BE49-F238E27FC236}">
-                <a16:creationId xmlns:a16="http://schemas.microsoft.com/office/drawing/2014/main" id="{5FDADF33-23CE-4371-9EF7-D0CC2F4F2DB2}"/>
-              </a:ext>
-            </a:extLst>
-          </p:cNvPr>
-          <p:cNvSpPr txBox="1"/>
-          <p:nvPr/>
-        </p:nvSpPr>
-        <p:spPr>
-          <a:xfrm>
-            <a:off x="6081776" y="4616658"/>
-            <a:ext cx="623392" cy="276999"/>
-          </a:xfrm>
-          <a:prstGeom prst="rect">
-            <a:avLst/>
-          </a:prstGeom>
-          <a:noFill/>
-        </p:spPr>
-        <p:txBody>
-          <a:bodyPr wrap="square" rtlCol="0">
-            <a:spAutoFit/>
-          </a:bodyPr>
-          <a:lstStyle/>
-          <a:p>
-            <a:r>
-              <a:rPr lang="pt-PT" sz="600" dirty="0"/>
-              <a:t>desempate &amp; </a:t>
-            </a:r>
-            <a:r>
-              <a:rPr lang="pt-PT" sz="600" dirty="0" err="1"/>
-              <a:t>nEmpates</a:t>
-            </a:r>
-            <a:r>
-              <a:rPr lang="pt-PT" sz="600" dirty="0"/>
-              <a:t> =0</a:t>
-            </a:r>
-          </a:p>
-        </p:txBody>
-      </p:sp>
-      <p:sp>
-        <p:nvSpPr>
-          <p:cNvPr id="196" name="CaixaDeTexto 195">
-            <a:extLst>
-              <a:ext uri="{FF2B5EF4-FFF2-40B4-BE49-F238E27FC236}">
-                <a16:creationId xmlns:a16="http://schemas.microsoft.com/office/drawing/2014/main" id="{90F0A1DB-054F-4078-A542-AC7B33716B50}"/>
-              </a:ext>
-            </a:extLst>
-          </p:cNvPr>
-          <p:cNvSpPr txBox="1"/>
-          <p:nvPr/>
-        </p:nvSpPr>
-        <p:spPr>
-          <a:xfrm>
-            <a:off x="5419314" y="3242252"/>
-            <a:ext cx="623392" cy="276999"/>
-          </a:xfrm>
-          <a:prstGeom prst="rect">
-            <a:avLst/>
-          </a:prstGeom>
-          <a:noFill/>
-        </p:spPr>
-        <p:txBody>
-          <a:bodyPr wrap="square" rtlCol="0">
-            <a:spAutoFit/>
-          </a:bodyPr>
-          <a:lstStyle/>
-          <a:p>
-            <a:r>
-              <a:rPr lang="pt-PT" sz="600" dirty="0"/>
-              <a:t>desempate &amp; </a:t>
-            </a:r>
-            <a:r>
-              <a:rPr lang="pt-PT" sz="600" dirty="0" err="1"/>
-              <a:t>nEmpates</a:t>
-            </a:r>
-            <a:r>
-              <a:rPr lang="pt-PT" sz="600" dirty="0"/>
-              <a:t> &gt; 0</a:t>
-            </a:r>
-          </a:p>
-        </p:txBody>
-      </p:sp>
-      <p:sp>
-        <p:nvSpPr>
-          <p:cNvPr id="197" name="CaixaDeTexto 196">
-            <a:extLst>
-              <a:ext uri="{FF2B5EF4-FFF2-40B4-BE49-F238E27FC236}">
-                <a16:creationId xmlns:a16="http://schemas.microsoft.com/office/drawing/2014/main" id="{426F2FE4-183D-414E-BDEB-D41F7807489B}"/>
-              </a:ext>
-            </a:extLst>
-          </p:cNvPr>
-          <p:cNvSpPr txBox="1"/>
-          <p:nvPr/>
-        </p:nvSpPr>
-        <p:spPr>
-          <a:xfrm>
-            <a:off x="3098319" y="6431846"/>
-            <a:ext cx="587020" cy="184666"/>
-          </a:xfrm>
-          <a:prstGeom prst="rect">
-            <a:avLst/>
-          </a:prstGeom>
-          <a:noFill/>
-        </p:spPr>
-        <p:txBody>
-          <a:bodyPr wrap="none" rtlCol="0">
-            <a:spAutoFit/>
-          </a:bodyPr>
-          <a:lstStyle/>
-          <a:p>
-            <a:r>
-              <a:rPr lang="pt-PT" sz="600" dirty="0"/>
-              <a:t>Fase3 aberta</a:t>
-            </a:r>
-          </a:p>
-        </p:txBody>
-      </p:sp>
-      <p:sp>
-        <p:nvSpPr>
-          <p:cNvPr id="198" name="CaixaDeTexto 197">
-            <a:extLst>
-              <a:ext uri="{FF2B5EF4-FFF2-40B4-BE49-F238E27FC236}">
-                <a16:creationId xmlns:a16="http://schemas.microsoft.com/office/drawing/2014/main" id="{9BA38E07-895D-44F4-8FDA-E1F6A19D3E21}"/>
-              </a:ext>
-            </a:extLst>
-          </p:cNvPr>
-          <p:cNvSpPr txBox="1"/>
-          <p:nvPr/>
-        </p:nvSpPr>
-        <p:spPr>
-          <a:xfrm>
-            <a:off x="3766681" y="6726036"/>
-            <a:ext cx="1366292" cy="461665"/>
-          </a:xfrm>
-          <a:prstGeom prst="rect">
-            <a:avLst/>
-          </a:prstGeom>
-          <a:noFill/>
-        </p:spPr>
-        <p:txBody>
-          <a:bodyPr wrap="square" rtlCol="0">
-            <a:spAutoFit/>
-          </a:bodyPr>
-          <a:lstStyle/>
-          <a:p>
-            <a:r>
-              <a:rPr lang="pt-PT" sz="600" dirty="0"/>
-              <a:t>Fase3 fechada </a:t>
-            </a:r>
-          </a:p>
-          <a:p>
-            <a:r>
-              <a:rPr lang="pt-PT" sz="600" dirty="0" err="1"/>
-              <a:t>nCandidaturas</a:t>
-            </a:r>
-            <a:r>
-              <a:rPr lang="pt-PT" sz="600" dirty="0"/>
-              <a:t> &gt;= </a:t>
-            </a:r>
-            <a:r>
-              <a:rPr lang="pt-PT" sz="600" dirty="0" err="1"/>
-              <a:t>nPropostas</a:t>
-            </a:r>
-            <a:endParaRPr lang="pt-PT" sz="600" dirty="0"/>
-          </a:p>
-          <a:p>
-            <a:r>
-              <a:rPr lang="pt-PT" sz="600" dirty="0"/>
-              <a:t>Se não estiverem, </a:t>
-            </a:r>
-          </a:p>
-          <a:p>
-            <a:r>
-              <a:rPr lang="pt-PT" sz="600" dirty="0"/>
-              <a:t>fechar fases anteriores</a:t>
-            </a:r>
-          </a:p>
-        </p:txBody>
-      </p:sp>
-      <p:sp>
-        <p:nvSpPr>
-          <p:cNvPr id="199" name="CaixaDeTexto 198">
-            <a:extLst>
-              <a:ext uri="{FF2B5EF4-FFF2-40B4-BE49-F238E27FC236}">
-                <a16:creationId xmlns:a16="http://schemas.microsoft.com/office/drawing/2014/main" id="{FA4275B6-304E-456E-A390-E50D8FEE9263}"/>
-              </a:ext>
-            </a:extLst>
-          </p:cNvPr>
-          <p:cNvSpPr txBox="1"/>
-          <p:nvPr/>
-        </p:nvSpPr>
-        <p:spPr>
-          <a:xfrm>
-            <a:off x="5164546" y="6247180"/>
-            <a:ext cx="587020" cy="276999"/>
-          </a:xfrm>
-          <a:prstGeom prst="rect">
-            <a:avLst/>
-          </a:prstGeom>
-          <a:noFill/>
-        </p:spPr>
-        <p:txBody>
-          <a:bodyPr wrap="none" rtlCol="0">
-            <a:spAutoFit/>
-          </a:bodyPr>
-          <a:lstStyle/>
-          <a:p>
-            <a:r>
-              <a:rPr lang="pt-PT" sz="600" dirty="0" err="1"/>
-              <a:t>return</a:t>
-            </a:r>
-            <a:endParaRPr lang="pt-PT" sz="600" dirty="0"/>
-          </a:p>
-          <a:p>
-            <a:r>
-              <a:rPr lang="pt-PT" sz="600" dirty="0"/>
-              <a:t>Fase4 aberta</a:t>
-            </a:r>
-          </a:p>
-        </p:txBody>
-      </p:sp>
-      <p:sp>
-        <p:nvSpPr>
-          <p:cNvPr id="200" name="CaixaDeTexto 199">
-            <a:extLst>
-              <a:ext uri="{FF2B5EF4-FFF2-40B4-BE49-F238E27FC236}">
-                <a16:creationId xmlns:a16="http://schemas.microsoft.com/office/drawing/2014/main" id="{EE49DB90-B271-41A6-88FE-C710E603EB8F}"/>
-              </a:ext>
-            </a:extLst>
-          </p:cNvPr>
-          <p:cNvSpPr txBox="1"/>
-          <p:nvPr/>
-        </p:nvSpPr>
-        <p:spPr>
-          <a:xfrm>
-            <a:off x="2566555" y="8281181"/>
-            <a:ext cx="649537" cy="200055"/>
-          </a:xfrm>
-          <a:prstGeom prst="rect">
-            <a:avLst/>
-          </a:prstGeom>
-          <a:noFill/>
-        </p:spPr>
-        <p:txBody>
-          <a:bodyPr wrap="none" rtlCol="0">
-            <a:spAutoFit/>
-          </a:bodyPr>
-          <a:lstStyle/>
-          <a:p>
-            <a:r>
-              <a:rPr lang="pt-PT" sz="700" dirty="0" err="1"/>
-              <a:t>mostraListas</a:t>
-            </a:r>
-            <a:endParaRPr lang="pt-PT" sz="700" dirty="0"/>
-          </a:p>
-        </p:txBody>
-      </p:sp>
-      <p:sp>
-        <p:nvSpPr>
-          <p:cNvPr id="201" name="CaixaDeTexto 200">
-            <a:extLst>
-              <a:ext uri="{FF2B5EF4-FFF2-40B4-BE49-F238E27FC236}">
-                <a16:creationId xmlns:a16="http://schemas.microsoft.com/office/drawing/2014/main" id="{94484B18-2D57-47E2-A723-4F7CB419B9A5}"/>
-              </a:ext>
-            </a:extLst>
-          </p:cNvPr>
-          <p:cNvSpPr txBox="1"/>
-          <p:nvPr/>
-        </p:nvSpPr>
-        <p:spPr>
-          <a:xfrm>
-            <a:off x="2264754" y="7081567"/>
-            <a:ext cx="1010213" cy="184666"/>
-          </a:xfrm>
-          <a:prstGeom prst="rect">
-            <a:avLst/>
-          </a:prstGeom>
-          <a:noFill/>
-        </p:spPr>
-        <p:txBody>
-          <a:bodyPr wrap="none" rtlCol="0">
-            <a:spAutoFit/>
-          </a:bodyPr>
-          <a:lstStyle/>
-          <a:p>
-            <a:r>
-              <a:rPr lang="pt-PT" sz="600" dirty="0" err="1"/>
-              <a:t>editaInfo</a:t>
-            </a:r>
-            <a:r>
-              <a:rPr lang="pt-PT" sz="600" dirty="0"/>
-              <a:t> &amp;&amp; Fase4 aberta</a:t>
-            </a:r>
-          </a:p>
-        </p:txBody>
-      </p:sp>
-      <p:sp>
-        <p:nvSpPr>
-          <p:cNvPr id="202" name="CaixaDeTexto 201">
-            <a:extLst>
-              <a:ext uri="{FF2B5EF4-FFF2-40B4-BE49-F238E27FC236}">
-                <a16:creationId xmlns:a16="http://schemas.microsoft.com/office/drawing/2014/main" id="{EA0BD39B-2B29-4123-932F-4755C81D2520}"/>
-              </a:ext>
-            </a:extLst>
-          </p:cNvPr>
-          <p:cNvSpPr txBox="1"/>
-          <p:nvPr/>
-        </p:nvSpPr>
-        <p:spPr>
-          <a:xfrm>
-            <a:off x="4232224" y="7981745"/>
-            <a:ext cx="1366080" cy="200055"/>
-          </a:xfrm>
-          <a:prstGeom prst="rect">
-            <a:avLst/>
-          </a:prstGeom>
-          <a:noFill/>
-        </p:spPr>
-        <p:txBody>
-          <a:bodyPr wrap="none" rtlCol="0">
-            <a:spAutoFit/>
-          </a:bodyPr>
-          <a:lstStyle/>
-          <a:p>
-            <a:r>
-              <a:rPr lang="pt-PT" sz="700" dirty="0" err="1"/>
-              <a:t>atribuicaoAuto</a:t>
-            </a:r>
-            <a:r>
-              <a:rPr lang="pt-PT" sz="700" dirty="0"/>
-              <a:t> &amp;&amp; Fase2 aberta</a:t>
-            </a:r>
-          </a:p>
-        </p:txBody>
-      </p:sp>
-      <p:sp>
-        <p:nvSpPr>
-          <p:cNvPr id="203" name="CaixaDeTexto 202">
-            <a:extLst>
-              <a:ext uri="{FF2B5EF4-FFF2-40B4-BE49-F238E27FC236}">
-                <a16:creationId xmlns:a16="http://schemas.microsoft.com/office/drawing/2014/main" id="{4E879942-B7FF-4103-945C-CAF302568B20}"/>
-              </a:ext>
-            </a:extLst>
-          </p:cNvPr>
-          <p:cNvSpPr txBox="1"/>
-          <p:nvPr/>
-        </p:nvSpPr>
-        <p:spPr>
-          <a:xfrm>
-            <a:off x="4404908" y="8879792"/>
-            <a:ext cx="649537" cy="200055"/>
-          </a:xfrm>
-          <a:prstGeom prst="rect">
-            <a:avLst/>
-          </a:prstGeom>
-          <a:noFill/>
-        </p:spPr>
-        <p:txBody>
-          <a:bodyPr wrap="none" rtlCol="0">
-            <a:spAutoFit/>
-          </a:bodyPr>
-          <a:lstStyle/>
-          <a:p>
-            <a:r>
-              <a:rPr lang="pt-PT" sz="700" dirty="0" err="1"/>
-              <a:t>mostraListas</a:t>
-            </a:r>
-            <a:endParaRPr lang="pt-PT" sz="700" dirty="0"/>
-          </a:p>
-        </p:txBody>
-      </p:sp>
-      <p:sp>
-        <p:nvSpPr>
-          <p:cNvPr id="207" name="CaixaDeTexto 206">
-            <a:extLst>
-              <a:ext uri="{FF2B5EF4-FFF2-40B4-BE49-F238E27FC236}">
-                <a16:creationId xmlns:a16="http://schemas.microsoft.com/office/drawing/2014/main" id="{D1B3B64E-3F8C-4AAD-917B-4362E567E92A}"/>
-              </a:ext>
-            </a:extLst>
-          </p:cNvPr>
-          <p:cNvSpPr txBox="1"/>
-          <p:nvPr/>
-        </p:nvSpPr>
-        <p:spPr>
-          <a:xfrm>
-            <a:off x="1326069" y="8871359"/>
-            <a:ext cx="641522" cy="200055"/>
-          </a:xfrm>
-          <a:prstGeom prst="rect">
-            <a:avLst/>
-          </a:prstGeom>
-          <a:noFill/>
-        </p:spPr>
-        <p:txBody>
-          <a:bodyPr wrap="none" rtlCol="0">
-            <a:spAutoFit/>
-          </a:bodyPr>
-          <a:lstStyle/>
-          <a:p>
-            <a:r>
-              <a:rPr lang="pt-PT" sz="700" dirty="0" err="1"/>
-              <a:t>exportarCVS</a:t>
-            </a:r>
-            <a:endParaRPr lang="pt-PT" sz="800" dirty="0"/>
-          </a:p>
-        </p:txBody>
-      </p:sp>
-      <p:sp>
-        <p:nvSpPr>
-          <p:cNvPr id="208" name="CaixaDeTexto 207">
-            <a:extLst>
-              <a:ext uri="{FF2B5EF4-FFF2-40B4-BE49-F238E27FC236}">
-                <a16:creationId xmlns:a16="http://schemas.microsoft.com/office/drawing/2014/main" id="{0979CD62-0A44-44AD-8606-8A0C2642DD7E}"/>
-              </a:ext>
-            </a:extLst>
-          </p:cNvPr>
-          <p:cNvSpPr txBox="1"/>
-          <p:nvPr/>
-        </p:nvSpPr>
-        <p:spPr>
-          <a:xfrm>
-            <a:off x="1226231" y="7509311"/>
-            <a:ext cx="641522" cy="200055"/>
-          </a:xfrm>
-          <a:prstGeom prst="rect">
-            <a:avLst/>
-          </a:prstGeom>
-          <a:noFill/>
-        </p:spPr>
-        <p:txBody>
-          <a:bodyPr wrap="none" rtlCol="0">
-            <a:spAutoFit/>
-          </a:bodyPr>
-          <a:lstStyle/>
-          <a:p>
-            <a:r>
-              <a:rPr lang="pt-PT" sz="700" dirty="0" err="1"/>
-              <a:t>exportarCVS</a:t>
-            </a:r>
-            <a:endParaRPr lang="pt-PT" sz="800" dirty="0"/>
-          </a:p>
-        </p:txBody>
-      </p:sp>
-      <p:sp>
-        <p:nvSpPr>
-          <p:cNvPr id="209" name="CaixaDeTexto 208">
-            <a:extLst>
-              <a:ext uri="{FF2B5EF4-FFF2-40B4-BE49-F238E27FC236}">
-                <a16:creationId xmlns:a16="http://schemas.microsoft.com/office/drawing/2014/main" id="{CB390CE8-B0D6-4789-B294-8B2A3608BEB8}"/>
-              </a:ext>
-            </a:extLst>
-          </p:cNvPr>
-          <p:cNvSpPr txBox="1"/>
-          <p:nvPr/>
-        </p:nvSpPr>
-        <p:spPr>
-          <a:xfrm>
-            <a:off x="3360206" y="8344484"/>
-            <a:ext cx="630301" cy="184666"/>
-          </a:xfrm>
-          <a:prstGeom prst="rect">
-            <a:avLst/>
-          </a:prstGeom>
-          <a:noFill/>
-        </p:spPr>
-        <p:txBody>
-          <a:bodyPr wrap="none" rtlCol="0">
-            <a:spAutoFit/>
-          </a:bodyPr>
-          <a:lstStyle/>
-          <a:p>
-            <a:r>
-              <a:rPr lang="pt-PT" sz="600" dirty="0"/>
-              <a:t>Fase4 fechada</a:t>
-            </a:r>
-          </a:p>
-        </p:txBody>
-      </p:sp>
-      <p:sp>
-        <p:nvSpPr>
-          <p:cNvPr id="210" name="CaixaDeTexto 209">
-            <a:extLst>
-              <a:ext uri="{FF2B5EF4-FFF2-40B4-BE49-F238E27FC236}">
-                <a16:creationId xmlns:a16="http://schemas.microsoft.com/office/drawing/2014/main" id="{9FE5160F-D613-4E45-A156-544D79F76F33}"/>
-              </a:ext>
-            </a:extLst>
-          </p:cNvPr>
-          <p:cNvSpPr txBox="1"/>
-          <p:nvPr/>
-        </p:nvSpPr>
-        <p:spPr>
-          <a:xfrm>
-            <a:off x="1288301" y="5180230"/>
-            <a:ext cx="1249060" cy="184666"/>
-          </a:xfrm>
-          <a:prstGeom prst="rect">
-            <a:avLst/>
-          </a:prstGeom>
-          <a:noFill/>
-        </p:spPr>
-        <p:txBody>
-          <a:bodyPr wrap="none" rtlCol="0">
-            <a:spAutoFit/>
-          </a:bodyPr>
-          <a:lstStyle/>
-          <a:p>
-            <a:r>
-              <a:rPr lang="pt-PT" sz="600" dirty="0"/>
-              <a:t>Importa/Exporta &amp;&amp; Fase3 aberta</a:t>
-            </a:r>
-          </a:p>
-        </p:txBody>
-      </p:sp>
+            <a:off x="3867150" y="484982"/>
+            <a:ext cx="2012950" cy="359568"/>
+          </a:xfrm>
+          <a:prstGeom prst="leftArrowCallout">
+            <a:avLst>
+              <a:gd name="adj1" fmla="val 4286"/>
+              <a:gd name="adj2" fmla="val 2857"/>
+              <a:gd name="adj3" fmla="val 3393"/>
+              <a:gd name="adj4" fmla="val 93801"/>
+            </a:avLst>
+          </a:prstGeom>
+          <a:solidFill>
+            <a:schemeClr val="accent4">
+              <a:lumMod val="40000"/>
+              <a:lumOff val="60000"/>
+            </a:schemeClr>
+          </a:solidFill>
+        </p:spPr>
+        <p:style>
+          <a:lnRef idx="0">
+            <a:schemeClr val="accent4"/>
+          </a:lnRef>
+          <a:fillRef idx="3">
+            <a:schemeClr val="accent4"/>
+          </a:fillRef>
+          <a:effectRef idx="3">
+            <a:schemeClr val="accent4"/>
+          </a:effectRef>
+          <a:fontRef idx="minor">
+            <a:schemeClr val="lt1"/>
+          </a:fontRef>
+        </p:style>
+        <p:txBody>
+          <a:bodyPr rtlCol="0" anchor="ctr"/>
+          <a:lstStyle/>
+          <a:p>
+            <a:pPr algn="ctr"/>
+            <a:r>
+              <a:rPr lang="pt-PT" sz="600" dirty="0">
+                <a:solidFill>
+                  <a:schemeClr val="tx1"/>
+                </a:solidFill>
+              </a:rPr>
+              <a:t>“edição” corresponde a vários métodos que permitem a edição da informação como inserirDocente , editarInfoDocente , eliminarDocente…</a:t>
+            </a:r>
+          </a:p>
+        </p:txBody>
+      </p:sp>
+      <p:cxnSp>
+        <p:nvCxnSpPr>
+          <p:cNvPr id="11" name="Conexão: Ângulo Reto 10">
+            <a:extLst>
+              <a:ext uri="{FF2B5EF4-FFF2-40B4-BE49-F238E27FC236}">
+                <a16:creationId xmlns:a16="http://schemas.microsoft.com/office/drawing/2014/main" id="{D8865871-7577-4688-A09A-948F905D0BA1}"/>
+              </a:ext>
+            </a:extLst>
+          </p:cNvPr>
+          <p:cNvCxnSpPr>
+            <a:stCxn id="82" idx="0"/>
+          </p:cNvCxnSpPr>
+          <p:nvPr/>
+        </p:nvCxnSpPr>
+        <p:spPr>
+          <a:xfrm rot="16200000" flipH="1" flipV="1">
+            <a:off x="1721683" y="323095"/>
+            <a:ext cx="2908222" cy="5456237"/>
+          </a:xfrm>
+          <a:prstGeom prst="bentConnector4">
+            <a:avLst>
+              <a:gd name="adj1" fmla="val -41594"/>
+              <a:gd name="adj2" fmla="val 100189"/>
+            </a:avLst>
+          </a:prstGeom>
+          <a:ln>
+            <a:tailEnd type="triangle"/>
+          </a:ln>
+        </p:spPr>
+        <p:style>
+          <a:lnRef idx="1">
+            <a:schemeClr val="accent3"/>
+          </a:lnRef>
+          <a:fillRef idx="0">
+            <a:schemeClr val="accent3"/>
+          </a:fillRef>
+          <a:effectRef idx="0">
+            <a:schemeClr val="accent3"/>
+          </a:effectRef>
+          <a:fontRef idx="minor">
+            <a:schemeClr val="tx1"/>
+          </a:fontRef>
+        </p:style>
+      </p:cxnSp>
     </p:spTree>
     <p:extLst>
       <p:ext uri="{BB962C8B-B14F-4D97-AF65-F5344CB8AC3E}">
@@ -6123,19 +7401,27 @@
           <a:prstGeom prst="roundRect">
             <a:avLst/>
           </a:prstGeom>
+          <a:solidFill>
+            <a:schemeClr val="accent3"/>
+          </a:solidFill>
+          <a:ln w="28575">
+            <a:solidFill>
+              <a:srgbClr val="C00000"/>
+            </a:solidFill>
+          </a:ln>
         </p:spPr>
         <p:style>
-          <a:lnRef idx="1">
-            <a:schemeClr val="accent3"/>
+          <a:lnRef idx="0">
+            <a:scrgbClr r="0" g="0" b="0"/>
           </a:lnRef>
-          <a:fillRef idx="2">
-            <a:schemeClr val="accent3"/>
+          <a:fillRef idx="0">
+            <a:scrgbClr r="0" g="0" b="0"/>
           </a:fillRef>
-          <a:effectRef idx="1">
-            <a:schemeClr val="accent3"/>
+          <a:effectRef idx="0">
+            <a:scrgbClr r="0" g="0" b="0"/>
           </a:effectRef>
           <a:fontRef idx="minor">
-            <a:schemeClr val="dk1"/>
+            <a:schemeClr val="lt1"/>
           </a:fontRef>
         </p:style>
         <p:txBody>
@@ -6222,51 +7508,22 @@
                       <a:pPr algn="l"/>
                       <a:r>
                         <a:rPr lang="pt-PT" sz="1000" b="0" dirty="0"/>
-                        <a:t>- </a:t>
-                      </a:r>
-                      <a:r>
-                        <a:rPr lang="pt-PT" sz="1000" b="0" dirty="0" err="1"/>
-                        <a:t>numEstudante</a:t>
-                      </a:r>
-                      <a:r>
-                        <a:rPr lang="pt-PT" sz="1000" b="0" dirty="0"/>
-                        <a:t> : </a:t>
-                      </a:r>
-                      <a:r>
-                        <a:rPr lang="pt-PT" sz="1000" b="0" dirty="0" err="1"/>
-                        <a:t>long</a:t>
-                      </a:r>
-                      <a:r>
-                        <a:rPr lang="pt-PT" sz="1000" b="0" dirty="0"/>
-                        <a:t> </a:t>
+                        <a:t>- numEstudante : long </a:t>
                       </a:r>
                     </a:p>
                     <a:p>
                       <a:pPr algn="l"/>
                       <a:r>
                         <a:rPr lang="pt-PT" sz="1000" b="0" dirty="0"/>
-                        <a:t>-nome : </a:t>
-                      </a:r>
-                      <a:r>
-                        <a:rPr lang="pt-PT" sz="1000" b="0" dirty="0" err="1"/>
-                        <a:t>string</a:t>
-                      </a:r>
-                      <a:r>
-                        <a:rPr lang="pt-PT" sz="1000" b="0" dirty="0"/>
-                        <a:t> </a:t>
+                        <a:t>-nome : string </a:t>
                       </a:r>
                     </a:p>
                     <a:p>
                       <a:pPr algn="l"/>
                       <a:r>
                         <a:rPr lang="pt-PT" sz="1000" b="0" dirty="0"/>
-                        <a:t>-mail : </a:t>
+                        <a:t>-mail : string</a:t>
                       </a:r>
-                      <a:r>
-                        <a:rPr lang="pt-PT" sz="1000" b="0" dirty="0" err="1"/>
-                        <a:t>string</a:t>
-                      </a:r>
-                      <a:endParaRPr lang="pt-PT" sz="1000" b="0" dirty="0"/>
                     </a:p>
                     <a:p>
                       <a:pPr algn="l"/>
@@ -6304,31 +7561,7 @@
                         <a:rPr lang="pt-PT" sz="1000" b="0" dirty="0">
                           <a:latin typeface="+mn-lt"/>
                         </a:rPr>
-                        <a:t>-</a:t>
-                      </a:r>
-                      <a:r>
-                        <a:rPr lang="pt-PT" sz="1000" b="0" dirty="0" err="1">
-                          <a:latin typeface="+mn-lt"/>
-                        </a:rPr>
-                        <a:t>classificacao</a:t>
-                      </a:r>
-                      <a:r>
-                        <a:rPr lang="pt-PT" sz="1000" b="0" dirty="0">
-                          <a:latin typeface="+mn-lt"/>
-                        </a:rPr>
-                        <a:t>: </a:t>
-                      </a:r>
-                      <a:r>
-                        <a:rPr lang="pt-PT" sz="1000" b="0" dirty="0" err="1">
-                          <a:latin typeface="+mn-lt"/>
-                        </a:rPr>
-                        <a:t>double</a:t>
-                      </a:r>
-                      <a:r>
-                        <a:rPr lang="pt-PT" sz="1000" b="0" dirty="0">
-                          <a:latin typeface="+mn-lt"/>
-                        </a:rPr>
-                        <a:t> </a:t>
+                        <a:t>-classificacao: double </a:t>
                       </a:r>
                     </a:p>
                     <a:p>
@@ -6337,29 +7570,8 @@
                         <a:rPr lang="pt-PT" sz="1000" b="0" dirty="0">
                           <a:latin typeface="+mn-lt"/>
                         </a:rPr>
-                        <a:t>-</a:t>
+                        <a:t>-estagioAcesso: boolean</a:t>
                       </a:r>
-                      <a:r>
-                        <a:rPr lang="pt-PT" sz="1000" b="0" dirty="0" err="1">
-                          <a:latin typeface="+mn-lt"/>
-                        </a:rPr>
-                        <a:t>estagioAcesso</a:t>
-                      </a:r>
-                      <a:r>
-                        <a:rPr lang="pt-PT" sz="1000" b="0" dirty="0">
-                          <a:latin typeface="+mn-lt"/>
-                        </a:rPr>
-                        <a:t>: </a:t>
-                      </a:r>
-                      <a:r>
-                        <a:rPr lang="pt-PT" sz="1000" b="0" dirty="0" err="1">
-                          <a:latin typeface="+mn-lt"/>
-                        </a:rPr>
-                        <a:t>boolean</a:t>
-                      </a:r>
-                      <a:endParaRPr lang="pt-PT" sz="1000" b="0" dirty="0">
-                        <a:latin typeface="+mn-lt"/>
-                      </a:endParaRPr>
                     </a:p>
                   </a:txBody>
                   <a:tcPr/>
@@ -6409,13 +7621,13 @@
           <p:nvPr>
             <p:extLst>
               <p:ext uri="{D42A27DB-BD31-4B8C-83A1-F6EECF244321}">
-                <p14:modId xmlns:p14="http://schemas.microsoft.com/office/powerpoint/2010/main" val="3559678637"/>
+                <p14:modId xmlns:p14="http://schemas.microsoft.com/office/powerpoint/2010/main" val="1750126933"/>
               </p:ext>
             </p:extLst>
           </p:nvPr>
         </p:nvGraphicFramePr>
         <p:xfrm>
-          <a:off x="3851487" y="8163905"/>
+          <a:off x="3813387" y="8072465"/>
           <a:ext cx="1530017" cy="1199401"/>
         </p:xfrm>
         <a:graphic>
@@ -6466,28 +7678,15 @@
                       <a:pPr algn="l"/>
                       <a:r>
                         <a:rPr lang="pt-PT" sz="1000" b="0" dirty="0"/>
-                        <a:t>-nome : </a:t>
-                      </a:r>
-                      <a:r>
-                        <a:rPr lang="pt-PT" sz="1000" b="0" dirty="0" err="1"/>
-                        <a:t>string</a:t>
-                      </a:r>
-                      <a:r>
-                        <a:rPr lang="pt-PT" sz="1000" b="0" dirty="0"/>
-                        <a:t> </a:t>
+                        <a:t>-nome : string </a:t>
                       </a:r>
                     </a:p>
                     <a:p>
                       <a:pPr algn="l"/>
                       <a:r>
                         <a:rPr lang="pt-PT" sz="1000" b="0" dirty="0"/>
-                        <a:t>-mail : </a:t>
+                        <a:t>-mail : string</a:t>
                       </a:r>
-                      <a:r>
-                        <a:rPr lang="pt-PT" sz="1000" b="0" dirty="0" err="1"/>
-                        <a:t>string</a:t>
-                      </a:r>
-                      <a:endParaRPr lang="pt-PT" sz="1000" b="0" dirty="0"/>
                     </a:p>
                     <a:p>
                       <a:pPr algn="l"/>
@@ -6495,17 +7694,8 @@
                         <a:rPr lang="pt-PT" sz="1000" b="0" dirty="0">
                           <a:latin typeface="+mn-lt"/>
                         </a:rPr>
-                        <a:t>-atividade: </a:t>
+                        <a:t>-atividade: string</a:t>
                       </a:r>
-                      <a:r>
-                        <a:rPr lang="pt-PT" sz="1000" b="0" dirty="0" err="1">
-                          <a:latin typeface="+mn-lt"/>
-                        </a:rPr>
-                        <a:t>string</a:t>
-                      </a:r>
-                      <a:endParaRPr lang="pt-PT" sz="1000" b="0" dirty="0">
-                        <a:latin typeface="+mn-lt"/>
-                      </a:endParaRPr>
                     </a:p>
                   </a:txBody>
                   <a:tcPr/>
@@ -6612,23 +7802,7 @@
                       <a:pPr algn="l"/>
                       <a:r>
                         <a:rPr lang="pt-PT" sz="1000" b="0" dirty="0"/>
-                        <a:t>-</a:t>
-                      </a:r>
-                      <a:r>
-                        <a:rPr lang="pt-PT" sz="1000" b="0" dirty="0" err="1"/>
-                        <a:t>codigoProp</a:t>
-                      </a:r>
-                      <a:r>
-                        <a:rPr lang="pt-PT" sz="1000" b="0" dirty="0"/>
-                        <a:t> : </a:t>
-                      </a:r>
-                      <a:r>
-                        <a:rPr lang="pt-PT" sz="1000" b="0" dirty="0" err="1"/>
-                        <a:t>string</a:t>
-                      </a:r>
-                      <a:r>
-                        <a:rPr lang="pt-PT" sz="1000" b="0" dirty="0"/>
-                        <a:t> </a:t>
+                        <a:t>-codigoProp : string </a:t>
                       </a:r>
                       <a:endParaRPr lang="pt-PT" sz="1000" b="0" dirty="0">
                         <a:latin typeface="+mn-lt"/>
@@ -6640,19 +7814,7 @@
                         <a:rPr lang="pt-PT" sz="1000" b="0" dirty="0">
                           <a:latin typeface="+mn-lt"/>
                         </a:rPr>
-                        <a:t>-</a:t>
-                      </a:r>
-                      <a:r>
-                        <a:rPr lang="pt-PT" sz="1000" b="0" dirty="0" err="1">
-                          <a:latin typeface="+mn-lt"/>
-                        </a:rPr>
-                        <a:t>area</a:t>
-                      </a:r>
-                      <a:r>
-                        <a:rPr lang="pt-PT" sz="1000" b="0" dirty="0">
-                          <a:latin typeface="+mn-lt"/>
-                        </a:rPr>
-                        <a:t> : </a:t>
+                        <a:t>-area : </a:t>
                       </a:r>
                       <a:r>
                         <a:rPr lang="pt-PT" sz="1000" b="1" dirty="0">
@@ -6683,17 +7845,8 @@
                         <a:rPr lang="pt-PT" sz="1000" b="0" dirty="0">
                           <a:latin typeface="+mn-lt"/>
                         </a:rPr>
-                        <a:t>-titulo : </a:t>
+                        <a:t>-titulo : string</a:t>
                       </a:r>
-                      <a:r>
-                        <a:rPr lang="pt-PT" sz="1000" b="0" dirty="0" err="1">
-                          <a:latin typeface="+mn-lt"/>
-                        </a:rPr>
-                        <a:t>string</a:t>
-                      </a:r>
-                      <a:endParaRPr lang="pt-PT" sz="1000" b="0" dirty="0">
-                        <a:latin typeface="+mn-lt"/>
-                      </a:endParaRPr>
                     </a:p>
                     <a:p>
                       <a:pPr marL="0" marR="0" lvl="0" indent="0" algn="l" defTabSz="685800" rtl="0" eaLnBrk="1" fontAlgn="auto" latinLnBrk="0" hangingPunct="1">
@@ -6840,65 +7993,7 @@
                         <a:rPr lang="pt-PT" sz="1000" b="0" dirty="0">
                           <a:latin typeface="+mn-lt"/>
                         </a:rPr>
-                        <a:t>-</a:t>
-                      </a:r>
-                      <a:r>
-                        <a:rPr lang="pt-PT" sz="1000" b="0" dirty="0" err="1">
-                          <a:latin typeface="+mn-lt"/>
-                        </a:rPr>
-                        <a:t>entAcolhimento</a:t>
-                      </a:r>
-                      <a:r>
-                        <a:rPr lang="pt-PT" sz="1000" b="0" dirty="0">
-                          <a:latin typeface="+mn-lt"/>
-                        </a:rPr>
-                        <a:t> : </a:t>
-                      </a:r>
-                      <a:r>
-                        <a:rPr lang="pt-PT" sz="1000" b="0" dirty="0" err="1">
-                          <a:latin typeface="+mn-lt"/>
-                        </a:rPr>
-                        <a:t>string</a:t>
-                      </a:r>
-                      <a:endParaRPr lang="pt-PT" sz="1000" b="0" dirty="0">
-                        <a:latin typeface="+mn-lt"/>
-                      </a:endParaRPr>
-                    </a:p>
-                    <a:p>
-                      <a:pPr marL="0" marR="0" lvl="0" indent="0" algn="l" defTabSz="685800" rtl="0" eaLnBrk="1" fontAlgn="auto" latinLnBrk="0" hangingPunct="1">
-                        <a:lnSpc>
-                          <a:spcPct val="100000"/>
-                        </a:lnSpc>
-                        <a:spcBef>
-                          <a:spcPts val="0"/>
-                        </a:spcBef>
-                        <a:spcAft>
-                          <a:spcPts val="0"/>
-                        </a:spcAft>
-                        <a:buClrTx/>
-                        <a:buSzTx/>
-                        <a:buFontTx/>
-                        <a:buNone/>
-                        <a:tabLst/>
-                        <a:defRPr/>
-                      </a:pPr>
-                      <a:r>
-                        <a:rPr lang="pt-PT" sz="1000" b="0" dirty="0">
-                          <a:latin typeface="+mn-lt"/>
-                        </a:rPr>
-                        <a:t>-</a:t>
-                      </a:r>
-                      <a:r>
-                        <a:rPr lang="pt-PT" sz="1000" b="0" dirty="0" err="1">
-                          <a:latin typeface="+mn-lt"/>
-                        </a:rPr>
-                        <a:t>orientadorEst</a:t>
-                      </a:r>
-                      <a:r>
-                        <a:rPr lang="pt-PT" sz="1000" b="0" dirty="0">
-                          <a:latin typeface="+mn-lt"/>
-                        </a:rPr>
-                        <a:t> : Docente</a:t>
+                        <a:t>-entAcolhimento : string</a:t>
                       </a:r>
                     </a:p>
                     <a:p>
@@ -6923,31 +8018,32 @@
                         <a:rPr lang="pt-PT" sz="1000" b="0" dirty="0">
                           <a:latin typeface="+mn-lt"/>
                         </a:rPr>
-                        <a:t>-</a:t>
+                        <a:t>-orientadorEst : Docente</a:t>
                       </a:r>
-                      <a:r>
-                        <a:rPr lang="pt-PT" sz="1000" b="0" dirty="0" err="1">
-                          <a:latin typeface="+mn-lt"/>
-                        </a:rPr>
-                        <a:t>numEstudante</a:t>
-                      </a:r>
+                    </a:p>
+                    <a:p>
+                      <a:pPr marL="0" marR="0" lvl="0" indent="0" algn="l" defTabSz="685800" rtl="0" eaLnBrk="1" fontAlgn="auto" latinLnBrk="0" hangingPunct="1">
+                        <a:lnSpc>
+                          <a:spcPct val="100000"/>
+                        </a:lnSpc>
+                        <a:spcBef>
+                          <a:spcPts val="0"/>
+                        </a:spcBef>
+                        <a:spcAft>
+                          <a:spcPts val="0"/>
+                        </a:spcAft>
+                        <a:buClrTx/>
+                        <a:buSzTx/>
+                        <a:buFontTx/>
+                        <a:buNone/>
+                        <a:tabLst/>
+                        <a:defRPr/>
+                      </a:pPr>
                       <a:r>
                         <a:rPr lang="pt-PT" sz="1000" b="0" dirty="0">
                           <a:latin typeface="+mn-lt"/>
                         </a:rPr>
-                        <a:t> : </a:t>
-                      </a:r>
-                      <a:r>
-                        <a:rPr lang="pt-PT" sz="1000" b="0" dirty="0" err="1">
-                          <a:latin typeface="+mn-lt"/>
-                        </a:rPr>
-                        <a:t>long</a:t>
-                      </a:r>
-                      <a:r>
-                        <a:rPr lang="pt-PT" sz="1000" b="0" dirty="0">
-                          <a:latin typeface="+mn-lt"/>
-                        </a:rPr>
-                        <a:t> </a:t>
+                        <a:t>-numEstudante : long </a:t>
                       </a:r>
                     </a:p>
                     <a:p>
@@ -7099,19 +8195,7 @@
                         <a:rPr lang="pt-PT" sz="1000" b="0" dirty="0">
                           <a:latin typeface="+mn-lt"/>
                         </a:rPr>
-                        <a:t>-</a:t>
-                      </a:r>
-                      <a:r>
-                        <a:rPr lang="pt-PT" sz="1000" b="0" dirty="0" err="1">
-                          <a:latin typeface="+mn-lt"/>
-                        </a:rPr>
-                        <a:t>orientadorProj</a:t>
-                      </a:r>
-                      <a:r>
-                        <a:rPr lang="pt-PT" sz="1000" b="0" dirty="0">
-                          <a:latin typeface="+mn-lt"/>
-                        </a:rPr>
-                        <a:t>: Docente</a:t>
+                        <a:t>-orientadorProj: Docente</a:t>
                       </a:r>
                     </a:p>
                     <a:p>
@@ -7136,31 +8220,7 @@
                         <a:rPr lang="pt-PT" sz="1000" b="0" dirty="0">
                           <a:latin typeface="+mn-lt"/>
                         </a:rPr>
-                        <a:t>-</a:t>
-                      </a:r>
-                      <a:r>
-                        <a:rPr lang="pt-PT" sz="1000" b="0" dirty="0" err="1">
-                          <a:latin typeface="+mn-lt"/>
-                        </a:rPr>
-                        <a:t>numEstudante</a:t>
-                      </a:r>
-                      <a:r>
-                        <a:rPr lang="pt-PT" sz="1000" b="0" dirty="0">
-                          <a:latin typeface="+mn-lt"/>
-                        </a:rPr>
-                        <a:t> : </a:t>
-                      </a:r>
-                      <a:r>
-                        <a:rPr lang="pt-PT" sz="1000" b="0" dirty="0" err="1">
-                          <a:latin typeface="+mn-lt"/>
-                        </a:rPr>
-                        <a:t>long</a:t>
-                      </a:r>
-                      <a:r>
-                        <a:rPr lang="pt-PT" sz="1000" b="0" dirty="0">
-                          <a:latin typeface="+mn-lt"/>
-                        </a:rPr>
-                        <a:t> </a:t>
+                        <a:t>-numEstudante : long </a:t>
                       </a:r>
                     </a:p>
                     <a:p>
@@ -7265,7 +8325,7 @@
           <a:lstStyle/>
           <a:p>
             <a:pPr algn="ctr"/>
-            <a:endParaRPr lang="pt-PT"/>
+            <a:endParaRPr lang="pt-PT" dirty="0"/>
           </a:p>
         </p:txBody>
       </p:sp>
@@ -7312,7 +8372,7 @@
           <a:lstStyle/>
           <a:p>
             <a:pPr algn="ctr"/>
-            <a:endParaRPr lang="pt-PT"/>
+            <a:endParaRPr lang="pt-PT" dirty="0"/>
           </a:p>
         </p:txBody>
       </p:sp>
@@ -7331,7 +8391,7 @@
           <p:nvPr>
             <p:extLst>
               <p:ext uri="{D42A27DB-BD31-4B8C-83A1-F6EECF244321}">
-                <p14:modId xmlns:p14="http://schemas.microsoft.com/office/powerpoint/2010/main" val="1348061280"/>
+                <p14:modId xmlns:p14="http://schemas.microsoft.com/office/powerpoint/2010/main" val="1682211349"/>
               </p:ext>
             </p:extLst>
           </p:nvPr>
@@ -7394,31 +8454,7 @@
                         <a:rPr lang="pt-PT" sz="1000" b="0" dirty="0">
                           <a:latin typeface="+mn-lt"/>
                         </a:rPr>
-                        <a:t>-</a:t>
-                      </a:r>
-                      <a:r>
-                        <a:rPr lang="pt-PT" sz="1000" b="0" dirty="0" err="1">
-                          <a:latin typeface="+mn-lt"/>
-                        </a:rPr>
-                        <a:t>codigoCand</a:t>
-                      </a:r>
-                      <a:r>
-                        <a:rPr lang="pt-PT" sz="1000" b="0" dirty="0">
-                          <a:latin typeface="+mn-lt"/>
-                        </a:rPr>
-                        <a:t> : </a:t>
-                      </a:r>
-                      <a:r>
-                        <a:rPr lang="pt-PT" sz="1000" b="0" dirty="0" err="1">
-                          <a:latin typeface="+mn-lt"/>
-                        </a:rPr>
-                        <a:t>long</a:t>
-                      </a:r>
-                      <a:r>
-                        <a:rPr lang="pt-PT" sz="1000" b="0" dirty="0">
-                          <a:latin typeface="+mn-lt"/>
-                        </a:rPr>
-                        <a:t> </a:t>
+                        <a:t>codigoCand : long </a:t>
                       </a:r>
                     </a:p>
                   </a:txBody>
@@ -7750,7 +8786,7 @@
                     <a:p>
                       <a:pPr algn="ctr"/>
                       <a:r>
-                        <a:rPr lang="pt-PT" sz="1100" b="0" dirty="0" err="1"/>
+                        <a:rPr lang="pt-PT" sz="1100" b="0" dirty="0"/>
                         <a:t>AutoProposta</a:t>
                       </a:r>
                       <a:endParaRPr lang="pt-PT" sz="1100" b="0" dirty="0">
@@ -7974,7 +9010,7 @@
         </p:nvSpPr>
         <p:spPr>
           <a:xfrm>
-            <a:off x="4060364" y="7921232"/>
+            <a:off x="3930824" y="7837412"/>
             <a:ext cx="235962" cy="215444"/>
           </a:xfrm>
           <a:prstGeom prst="rect">
@@ -8392,7 +9428,7 @@
           <a:lstStyle/>
           <a:p>
             <a:pPr algn="ctr"/>
-            <a:endParaRPr lang="pt-PT"/>
+            <a:endParaRPr lang="pt-PT" dirty="0"/>
           </a:p>
         </p:txBody>
       </p:sp>

</xml_diff>